<commit_message>
[monitoring_dift_drop] Add policies section.
</commit_message>
<xml_diff>
--- a/monitoring_dift_drop/figs_src/diagrams-wide.pptx
+++ b/monitoring_dift_drop/figs_src/diagrams-wide.pptx
@@ -10,6 +10,10 @@
     <p:sldId id="259" r:id="rId4"/>
     <p:sldId id="260" r:id="rId5"/>
     <p:sldId id="261" r:id="rId6"/>
+    <p:sldId id="262" r:id="rId7"/>
+    <p:sldId id="263" r:id="rId8"/>
+    <p:sldId id="264" r:id="rId9"/>
+    <p:sldId id="265" r:id="rId10"/>
   </p:sldIdLst>
   <p:sldSz cx="5303838" cy="10058400"/>
   <p:notesSz cx="4845050" cy="9601200"/>
@@ -292,7 +296,7 @@
           <a:p>
             <a:fld id="{D9DE92D4-3454-4E80-9822-1258D18FA6E8}" type="datetimeFigureOut">
               <a:rPr lang="en-US" smtClean="0"/>
-              <a:t>3/2/2015</a:t>
+              <a:t>3/3/2015</a:t>
             </a:fld>
             <a:endParaRPr lang="en-US"/>
           </a:p>
@@ -462,7 +466,7 @@
           <a:p>
             <a:fld id="{D9DE92D4-3454-4E80-9822-1258D18FA6E8}" type="datetimeFigureOut">
               <a:rPr lang="en-US" smtClean="0"/>
-              <a:t>3/2/2015</a:t>
+              <a:t>3/3/2015</a:t>
             </a:fld>
             <a:endParaRPr lang="en-US"/>
           </a:p>
@@ -642,7 +646,7 @@
           <a:p>
             <a:fld id="{D9DE92D4-3454-4E80-9822-1258D18FA6E8}" type="datetimeFigureOut">
               <a:rPr lang="en-US" smtClean="0"/>
-              <a:t>3/2/2015</a:t>
+              <a:t>3/3/2015</a:t>
             </a:fld>
             <a:endParaRPr lang="en-US"/>
           </a:p>
@@ -812,7 +816,7 @@
           <a:p>
             <a:fld id="{D9DE92D4-3454-4E80-9822-1258D18FA6E8}" type="datetimeFigureOut">
               <a:rPr lang="en-US" smtClean="0"/>
-              <a:t>3/2/2015</a:t>
+              <a:t>3/3/2015</a:t>
             </a:fld>
             <a:endParaRPr lang="en-US"/>
           </a:p>
@@ -1058,7 +1062,7 @@
           <a:p>
             <a:fld id="{D9DE92D4-3454-4E80-9822-1258D18FA6E8}" type="datetimeFigureOut">
               <a:rPr lang="en-US" smtClean="0"/>
-              <a:t>3/2/2015</a:t>
+              <a:t>3/3/2015</a:t>
             </a:fld>
             <a:endParaRPr lang="en-US"/>
           </a:p>
@@ -1346,7 +1350,7 @@
           <a:p>
             <a:fld id="{D9DE92D4-3454-4E80-9822-1258D18FA6E8}" type="datetimeFigureOut">
               <a:rPr lang="en-US" smtClean="0"/>
-              <a:t>3/2/2015</a:t>
+              <a:t>3/3/2015</a:t>
             </a:fld>
             <a:endParaRPr lang="en-US"/>
           </a:p>
@@ -1773,7 +1777,7 @@
           <a:p>
             <a:fld id="{D9DE92D4-3454-4E80-9822-1258D18FA6E8}" type="datetimeFigureOut">
               <a:rPr lang="en-US" smtClean="0"/>
-              <a:t>3/2/2015</a:t>
+              <a:t>3/3/2015</a:t>
             </a:fld>
             <a:endParaRPr lang="en-US"/>
           </a:p>
@@ -1891,7 +1895,7 @@
           <a:p>
             <a:fld id="{D9DE92D4-3454-4E80-9822-1258D18FA6E8}" type="datetimeFigureOut">
               <a:rPr lang="en-US" smtClean="0"/>
-              <a:t>3/2/2015</a:t>
+              <a:t>3/3/2015</a:t>
             </a:fld>
             <a:endParaRPr lang="en-US"/>
           </a:p>
@@ -1986,7 +1990,7 @@
           <a:p>
             <a:fld id="{D9DE92D4-3454-4E80-9822-1258D18FA6E8}" type="datetimeFigureOut">
               <a:rPr lang="en-US" smtClean="0"/>
-              <a:t>3/2/2015</a:t>
+              <a:t>3/3/2015</a:t>
             </a:fld>
             <a:endParaRPr lang="en-US"/>
           </a:p>
@@ -2263,7 +2267,7 @@
           <a:p>
             <a:fld id="{D9DE92D4-3454-4E80-9822-1258D18FA6E8}" type="datetimeFigureOut">
               <a:rPr lang="en-US" smtClean="0"/>
-              <a:t>3/2/2015</a:t>
+              <a:t>3/3/2015</a:t>
             </a:fld>
             <a:endParaRPr lang="en-US"/>
           </a:p>
@@ -2516,7 +2520,7 @@
           <a:p>
             <a:fld id="{D9DE92D4-3454-4E80-9822-1258D18FA6E8}" type="datetimeFigureOut">
               <a:rPr lang="en-US" smtClean="0"/>
-              <a:t>3/2/2015</a:t>
+              <a:t>3/3/2015</a:t>
             </a:fld>
             <a:endParaRPr lang="en-US"/>
           </a:p>
@@ -2729,7 +2733,7 @@
           <a:p>
             <a:fld id="{D9DE92D4-3454-4E80-9822-1258D18FA6E8}" type="datetimeFigureOut">
               <a:rPr lang="en-US" smtClean="0"/>
-              <a:t>3/2/2015</a:t>
+              <a:t>3/3/2015</a:t>
             </a:fld>
             <a:endParaRPr lang="en-US"/>
           </a:p>
@@ -8322,25 +8326,8 @@
                 <a:latin typeface="Arial" pitchFamily="34" charset="0"/>
                 <a:cs typeface="Arial" pitchFamily="34" charset="0"/>
               </a:rPr>
-              <a:t>Dataflow Flag </a:t>
-            </a:r>
-            <a:r>
-              <a:rPr lang="en-US" sz="800" dirty="0" smtClean="0">
-                <a:solidFill>
-                  <a:schemeClr val="tx1"/>
-                </a:solidFill>
-                <a:latin typeface="Arial" pitchFamily="34" charset="0"/>
-                <a:cs typeface="Arial" pitchFamily="34" charset="0"/>
-              </a:rPr>
-              <a:t>RF</a:t>
-            </a:r>
-            <a:endParaRPr lang="en-US" sz="800" dirty="0" smtClean="0">
-              <a:solidFill>
-                <a:schemeClr val="tx1"/>
-              </a:solidFill>
-              <a:latin typeface="Arial" pitchFamily="34" charset="0"/>
-              <a:cs typeface="Arial" pitchFamily="34" charset="0"/>
-            </a:endParaRPr>
+              <a:t>Dataflow Flag RF</a:t>
+            </a:r>
           </a:p>
         </p:txBody>
       </p:sp>
@@ -10328,6 +10315,2948 @@
     <p:extLst>
       <p:ext uri="{BB962C8B-B14F-4D97-AF65-F5344CB8AC3E}">
         <p14:creationId xmlns:p14="http://schemas.microsoft.com/office/powerpoint/2010/main" val="154311924"/>
+      </p:ext>
+    </p:extLst>
+  </p:cSld>
+  <p:clrMapOvr>
+    <a:masterClrMapping/>
+  </p:clrMapOvr>
+</p:sld>
+</file>
+
+<file path=ppt/slides/slide6.xml><?xml version="1.0" encoding="utf-8"?>
+<p:sld xmlns:a="http://schemas.openxmlformats.org/drawingml/2006/main" xmlns:r="http://schemas.openxmlformats.org/officeDocument/2006/relationships" xmlns:p="http://schemas.openxmlformats.org/presentationml/2006/main">
+  <p:cSld>
+    <p:spTree>
+      <p:nvGrpSpPr>
+        <p:cNvPr id="1" name=""/>
+        <p:cNvGrpSpPr/>
+        <p:nvPr/>
+      </p:nvGrpSpPr>
+      <p:grpSpPr>
+        <a:xfrm>
+          <a:off x="0" y="0"/>
+          <a:ext cx="0" cy="0"/>
+          <a:chOff x="0" y="0"/>
+          <a:chExt cx="0" cy="0"/>
+        </a:xfrm>
+      </p:grpSpPr>
+      <p:sp>
+        <p:nvSpPr>
+          <p:cNvPr id="2" name="Rectangle 1"/>
+          <p:cNvSpPr/>
+          <p:nvPr/>
+        </p:nvSpPr>
+        <p:spPr>
+          <a:xfrm>
+            <a:off x="2689871" y="47542"/>
+            <a:ext cx="649117" cy="1247858"/>
+          </a:xfrm>
+          <a:prstGeom prst="rect">
+            <a:avLst/>
+          </a:prstGeom>
+          <a:solidFill>
+            <a:schemeClr val="bg1">
+              <a:lumMod val="75000"/>
+            </a:schemeClr>
+          </a:solidFill>
+          <a:ln>
+            <a:noFill/>
+          </a:ln>
+        </p:spPr>
+        <p:style>
+          <a:lnRef idx="2">
+            <a:schemeClr val="accent1">
+              <a:shade val="50000"/>
+            </a:schemeClr>
+          </a:lnRef>
+          <a:fillRef idx="1">
+            <a:schemeClr val="accent1"/>
+          </a:fillRef>
+          <a:effectRef idx="0">
+            <a:schemeClr val="accent1"/>
+          </a:effectRef>
+          <a:fontRef idx="minor">
+            <a:schemeClr val="lt1"/>
+          </a:fontRef>
+        </p:style>
+        <p:txBody>
+          <a:bodyPr rtlCol="0" anchor="ctr"/>
+          <a:lstStyle/>
+          <a:p>
+            <a:pPr algn="ctr"/>
+            <a:endParaRPr lang="en-US" sz="800">
+              <a:latin typeface="Arial" pitchFamily="34" charset="0"/>
+              <a:cs typeface="Arial" pitchFamily="34" charset="0"/>
+            </a:endParaRPr>
+          </a:p>
+        </p:txBody>
+      </p:sp>
+      <p:cxnSp>
+        <p:nvCxnSpPr>
+          <p:cNvPr id="3" name="Straight Arrow Connector 2"/>
+          <p:cNvCxnSpPr/>
+          <p:nvPr/>
+        </p:nvCxnSpPr>
+        <p:spPr>
+          <a:xfrm flipV="1">
+            <a:off x="1559982" y="28035"/>
+            <a:ext cx="0" cy="1228957"/>
+          </a:xfrm>
+          <a:prstGeom prst="straightConnector1">
+            <a:avLst/>
+          </a:prstGeom>
+          <a:ln w="12700">
+            <a:solidFill>
+              <a:schemeClr val="tx1"/>
+            </a:solidFill>
+            <a:headEnd w="sm" len="sm"/>
+            <a:tailEnd type="arrow" w="sm" len="sm"/>
+          </a:ln>
+        </p:spPr>
+        <p:style>
+          <a:lnRef idx="1">
+            <a:schemeClr val="accent1"/>
+          </a:lnRef>
+          <a:fillRef idx="0">
+            <a:schemeClr val="accent1"/>
+          </a:fillRef>
+          <a:effectRef idx="0">
+            <a:schemeClr val="accent1"/>
+          </a:effectRef>
+          <a:fontRef idx="minor">
+            <a:schemeClr val="tx1"/>
+          </a:fontRef>
+        </p:style>
+      </p:cxnSp>
+      <p:cxnSp>
+        <p:nvCxnSpPr>
+          <p:cNvPr id="4" name="Straight Arrow Connector 3"/>
+          <p:cNvCxnSpPr/>
+          <p:nvPr/>
+        </p:nvCxnSpPr>
+        <p:spPr>
+          <a:xfrm>
+            <a:off x="1426011" y="834539"/>
+            <a:ext cx="2646440" cy="0"/>
+          </a:xfrm>
+          <a:prstGeom prst="straightConnector1">
+            <a:avLst/>
+          </a:prstGeom>
+          <a:ln w="12700">
+            <a:solidFill>
+              <a:schemeClr val="tx1"/>
+            </a:solidFill>
+            <a:headEnd w="sm" len="sm"/>
+            <a:tailEnd type="arrow" w="sm" len="sm"/>
+          </a:ln>
+        </p:spPr>
+        <p:style>
+          <a:lnRef idx="1">
+            <a:schemeClr val="accent1"/>
+          </a:lnRef>
+          <a:fillRef idx="0">
+            <a:schemeClr val="accent1"/>
+          </a:fillRef>
+          <a:effectRef idx="0">
+            <a:schemeClr val="accent1"/>
+          </a:effectRef>
+          <a:fontRef idx="minor">
+            <a:schemeClr val="tx1"/>
+          </a:fontRef>
+        </p:style>
+      </p:cxnSp>
+      <p:sp>
+        <p:nvSpPr>
+          <p:cNvPr id="5" name="Rectangle 4"/>
+          <p:cNvSpPr/>
+          <p:nvPr/>
+        </p:nvSpPr>
+        <p:spPr>
+          <a:xfrm>
+            <a:off x="3814632" y="826035"/>
+            <a:ext cx="437487" cy="200529"/>
+          </a:xfrm>
+          <a:prstGeom prst="rect">
+            <a:avLst/>
+          </a:prstGeom>
+          <a:noFill/>
+          <a:ln>
+            <a:noFill/>
+          </a:ln>
+        </p:spPr>
+        <p:style>
+          <a:lnRef idx="2">
+            <a:schemeClr val="accent2">
+              <a:shade val="50000"/>
+            </a:schemeClr>
+          </a:lnRef>
+          <a:fillRef idx="1">
+            <a:schemeClr val="accent2"/>
+          </a:fillRef>
+          <a:effectRef idx="0">
+            <a:schemeClr val="accent2"/>
+          </a:effectRef>
+          <a:fontRef idx="minor">
+            <a:schemeClr val="lt1"/>
+          </a:fontRef>
+        </p:style>
+        <p:txBody>
+          <a:bodyPr rtlCol="0" anchor="ctr"/>
+          <a:lstStyle/>
+          <a:p>
+            <a:r>
+              <a:rPr lang="en-US" sz="800" dirty="0" smtClean="0">
+                <a:solidFill>
+                  <a:schemeClr val="tx1"/>
+                </a:solidFill>
+                <a:latin typeface="Arial" pitchFamily="34" charset="0"/>
+                <a:cs typeface="Arial" pitchFamily="34" charset="0"/>
+              </a:rPr>
+              <a:t>time</a:t>
+            </a:r>
+            <a:endParaRPr lang="en-US" sz="800" dirty="0">
+              <a:solidFill>
+                <a:schemeClr val="tx1"/>
+              </a:solidFill>
+              <a:latin typeface="Arial" pitchFamily="34" charset="0"/>
+              <a:cs typeface="Arial" pitchFamily="34" charset="0"/>
+            </a:endParaRPr>
+          </a:p>
+        </p:txBody>
+      </p:sp>
+      <p:sp>
+        <p:nvSpPr>
+          <p:cNvPr id="6" name="Rectangle 5"/>
+          <p:cNvSpPr/>
+          <p:nvPr/>
+        </p:nvSpPr>
+        <p:spPr>
+          <a:xfrm>
+            <a:off x="1174541" y="29158"/>
+            <a:ext cx="500160" cy="200529"/>
+          </a:xfrm>
+          <a:prstGeom prst="rect">
+            <a:avLst/>
+          </a:prstGeom>
+          <a:noFill/>
+          <a:ln>
+            <a:noFill/>
+          </a:ln>
+        </p:spPr>
+        <p:style>
+          <a:lnRef idx="2">
+            <a:schemeClr val="accent2">
+              <a:shade val="50000"/>
+            </a:schemeClr>
+          </a:lnRef>
+          <a:fillRef idx="1">
+            <a:schemeClr val="accent2"/>
+          </a:fillRef>
+          <a:effectRef idx="0">
+            <a:schemeClr val="accent2"/>
+          </a:effectRef>
+          <a:fontRef idx="minor">
+            <a:schemeClr val="lt1"/>
+          </a:fontRef>
+        </p:style>
+        <p:txBody>
+          <a:bodyPr rtlCol="0" anchor="ctr"/>
+          <a:lstStyle/>
+          <a:p>
+            <a:r>
+              <a:rPr lang="en-US" sz="800" dirty="0" smtClean="0">
+                <a:solidFill>
+                  <a:schemeClr val="tx1"/>
+                </a:solidFill>
+                <a:latin typeface="Arial" pitchFamily="34" charset="0"/>
+                <a:cs typeface="Arial" pitchFamily="34" charset="0"/>
+              </a:rPr>
+              <a:t>slack</a:t>
+            </a:r>
+            <a:endParaRPr lang="en-US" sz="800" dirty="0">
+              <a:solidFill>
+                <a:schemeClr val="tx1"/>
+              </a:solidFill>
+              <a:latin typeface="Arial" pitchFamily="34" charset="0"/>
+              <a:cs typeface="Arial" pitchFamily="34" charset="0"/>
+            </a:endParaRPr>
+          </a:p>
+        </p:txBody>
+      </p:sp>
+      <p:cxnSp>
+        <p:nvCxnSpPr>
+          <p:cNvPr id="7" name="Straight Arrow Connector 6"/>
+          <p:cNvCxnSpPr/>
+          <p:nvPr/>
+        </p:nvCxnSpPr>
+        <p:spPr>
+          <a:xfrm flipV="1">
+            <a:off x="1559982" y="505173"/>
+            <a:ext cx="345645" cy="128836"/>
+          </a:xfrm>
+          <a:prstGeom prst="straightConnector1">
+            <a:avLst/>
+          </a:prstGeom>
+          <a:ln w="12700">
+            <a:solidFill>
+              <a:srgbClr val="33A02C"/>
+            </a:solidFill>
+            <a:headEnd w="sm" len="sm"/>
+            <a:tailEnd type="triangle" w="med" len="med"/>
+          </a:ln>
+        </p:spPr>
+        <p:style>
+          <a:lnRef idx="1">
+            <a:schemeClr val="accent1"/>
+          </a:lnRef>
+          <a:fillRef idx="0">
+            <a:schemeClr val="accent1"/>
+          </a:fillRef>
+          <a:effectRef idx="0">
+            <a:schemeClr val="accent1"/>
+          </a:effectRef>
+          <a:fontRef idx="minor">
+            <a:schemeClr val="tx1"/>
+          </a:fontRef>
+        </p:style>
+      </p:cxnSp>
+      <p:cxnSp>
+        <p:nvCxnSpPr>
+          <p:cNvPr id="8" name="Straight Connector 7"/>
+          <p:cNvCxnSpPr/>
+          <p:nvPr/>
+        </p:nvCxnSpPr>
+        <p:spPr>
+          <a:xfrm flipH="1">
+            <a:off x="1511419" y="634009"/>
+            <a:ext cx="95890" cy="0"/>
+          </a:xfrm>
+          <a:prstGeom prst="line">
+            <a:avLst/>
+          </a:prstGeom>
+          <a:ln w="12700">
+            <a:solidFill>
+              <a:schemeClr val="tx1"/>
+            </a:solidFill>
+          </a:ln>
+        </p:spPr>
+        <p:style>
+          <a:lnRef idx="1">
+            <a:schemeClr val="accent1"/>
+          </a:lnRef>
+          <a:fillRef idx="0">
+            <a:schemeClr val="accent1"/>
+          </a:fillRef>
+          <a:effectRef idx="0">
+            <a:schemeClr val="accent1"/>
+          </a:effectRef>
+          <a:fontRef idx="minor">
+            <a:schemeClr val="tx1"/>
+          </a:fontRef>
+        </p:style>
+      </p:cxnSp>
+      <p:sp>
+        <p:nvSpPr>
+          <p:cNvPr id="9" name="Rectangle 8"/>
+          <p:cNvSpPr/>
+          <p:nvPr/>
+        </p:nvSpPr>
+        <p:spPr>
+          <a:xfrm>
+            <a:off x="1135241" y="518795"/>
+            <a:ext cx="500160" cy="200529"/>
+          </a:xfrm>
+          <a:prstGeom prst="rect">
+            <a:avLst/>
+          </a:prstGeom>
+          <a:noFill/>
+          <a:ln>
+            <a:noFill/>
+          </a:ln>
+        </p:spPr>
+        <p:style>
+          <a:lnRef idx="2">
+            <a:schemeClr val="accent2">
+              <a:shade val="50000"/>
+            </a:schemeClr>
+          </a:lnRef>
+          <a:fillRef idx="1">
+            <a:schemeClr val="accent2"/>
+          </a:fillRef>
+          <a:effectRef idx="0">
+            <a:schemeClr val="accent2"/>
+          </a:effectRef>
+          <a:fontRef idx="minor">
+            <a:schemeClr val="lt1"/>
+          </a:fontRef>
+        </p:style>
+        <p:txBody>
+          <a:bodyPr rtlCol="0" anchor="ctr"/>
+          <a:lstStyle/>
+          <a:p>
+            <a:r>
+              <a:rPr lang="en-US" sz="800" dirty="0" smtClean="0">
+                <a:solidFill>
+                  <a:schemeClr val="tx1"/>
+                </a:solidFill>
+                <a:latin typeface="Arial" pitchFamily="34" charset="0"/>
+                <a:cs typeface="Arial" pitchFamily="34" charset="0"/>
+              </a:rPr>
+              <a:t>initial slack</a:t>
+            </a:r>
+            <a:endParaRPr lang="en-US" sz="800" dirty="0">
+              <a:solidFill>
+                <a:schemeClr val="tx1"/>
+              </a:solidFill>
+              <a:latin typeface="Arial" pitchFamily="34" charset="0"/>
+              <a:cs typeface="Arial" pitchFamily="34" charset="0"/>
+            </a:endParaRPr>
+          </a:p>
+        </p:txBody>
+      </p:sp>
+      <p:sp>
+        <p:nvSpPr>
+          <p:cNvPr id="10" name="Rectangle 9"/>
+          <p:cNvSpPr/>
+          <p:nvPr/>
+        </p:nvSpPr>
+        <p:spPr>
+          <a:xfrm>
+            <a:off x="2014905" y="47541"/>
+            <a:ext cx="775204" cy="200529"/>
+          </a:xfrm>
+          <a:prstGeom prst="rect">
+            <a:avLst/>
+          </a:prstGeom>
+          <a:noFill/>
+          <a:ln>
+            <a:noFill/>
+          </a:ln>
+        </p:spPr>
+        <p:style>
+          <a:lnRef idx="2">
+            <a:schemeClr val="accent2">
+              <a:shade val="50000"/>
+            </a:schemeClr>
+          </a:lnRef>
+          <a:fillRef idx="1">
+            <a:schemeClr val="accent2"/>
+          </a:fillRef>
+          <a:effectRef idx="0">
+            <a:schemeClr val="accent2"/>
+          </a:effectRef>
+          <a:fontRef idx="minor">
+            <a:schemeClr val="lt1"/>
+          </a:fontRef>
+        </p:style>
+        <p:txBody>
+          <a:bodyPr rtlCol="0" anchor="ctr"/>
+          <a:lstStyle/>
+          <a:p>
+            <a:pPr algn="ctr"/>
+            <a:r>
+              <a:rPr lang="en-US" sz="800" dirty="0" smtClean="0">
+                <a:solidFill>
+                  <a:schemeClr val="tx1"/>
+                </a:solidFill>
+                <a:latin typeface="Arial" pitchFamily="34" charset="0"/>
+                <a:cs typeface="Arial" pitchFamily="34" charset="0"/>
+              </a:rPr>
+              <a:t>monitoring overheads</a:t>
+            </a:r>
+            <a:endParaRPr lang="en-US" sz="800" dirty="0">
+              <a:solidFill>
+                <a:schemeClr val="tx1"/>
+              </a:solidFill>
+              <a:latin typeface="Arial" pitchFamily="34" charset="0"/>
+              <a:cs typeface="Arial" pitchFamily="34" charset="0"/>
+            </a:endParaRPr>
+          </a:p>
+        </p:txBody>
+      </p:sp>
+      <p:cxnSp>
+        <p:nvCxnSpPr>
+          <p:cNvPr id="11" name="Straight Arrow Connector 10"/>
+          <p:cNvCxnSpPr/>
+          <p:nvPr/>
+        </p:nvCxnSpPr>
+        <p:spPr>
+          <a:xfrm>
+            <a:off x="1905627" y="505173"/>
+            <a:ext cx="190634" cy="198834"/>
+          </a:xfrm>
+          <a:prstGeom prst="straightConnector1">
+            <a:avLst/>
+          </a:prstGeom>
+          <a:ln w="12700">
+            <a:solidFill>
+              <a:srgbClr val="E31A1C"/>
+            </a:solidFill>
+            <a:headEnd w="sm" len="sm"/>
+            <a:tailEnd type="triangle" w="med" len="med"/>
+          </a:ln>
+        </p:spPr>
+        <p:style>
+          <a:lnRef idx="1">
+            <a:schemeClr val="accent1"/>
+          </a:lnRef>
+          <a:fillRef idx="0">
+            <a:schemeClr val="accent1"/>
+          </a:fillRef>
+          <a:effectRef idx="0">
+            <a:schemeClr val="accent1"/>
+          </a:effectRef>
+          <a:fontRef idx="minor">
+            <a:schemeClr val="tx1"/>
+          </a:fontRef>
+        </p:style>
+      </p:cxnSp>
+      <p:cxnSp>
+        <p:nvCxnSpPr>
+          <p:cNvPr id="12" name="Straight Arrow Connector 11"/>
+          <p:cNvCxnSpPr/>
+          <p:nvPr/>
+        </p:nvCxnSpPr>
+        <p:spPr>
+          <a:xfrm flipV="1">
+            <a:off x="2096261" y="575171"/>
+            <a:ext cx="345645" cy="128836"/>
+          </a:xfrm>
+          <a:prstGeom prst="straightConnector1">
+            <a:avLst/>
+          </a:prstGeom>
+          <a:ln w="12700">
+            <a:solidFill>
+              <a:srgbClr val="33A02C"/>
+            </a:solidFill>
+            <a:headEnd w="sm" len="sm"/>
+            <a:tailEnd type="triangle" w="med" len="med"/>
+          </a:ln>
+        </p:spPr>
+        <p:style>
+          <a:lnRef idx="1">
+            <a:schemeClr val="accent1"/>
+          </a:lnRef>
+          <a:fillRef idx="0">
+            <a:schemeClr val="accent1"/>
+          </a:fillRef>
+          <a:effectRef idx="0">
+            <a:schemeClr val="accent1"/>
+          </a:effectRef>
+          <a:fontRef idx="minor">
+            <a:schemeClr val="tx1"/>
+          </a:fontRef>
+        </p:style>
+      </p:cxnSp>
+      <p:cxnSp>
+        <p:nvCxnSpPr>
+          <p:cNvPr id="13" name="Straight Arrow Connector 12"/>
+          <p:cNvCxnSpPr/>
+          <p:nvPr/>
+        </p:nvCxnSpPr>
+        <p:spPr>
+          <a:xfrm flipH="1">
+            <a:off x="2000945" y="296869"/>
+            <a:ext cx="210531" cy="272722"/>
+          </a:xfrm>
+          <a:prstGeom prst="straightConnector1">
+            <a:avLst/>
+          </a:prstGeom>
+          <a:ln w="12700">
+            <a:solidFill>
+              <a:schemeClr val="tx1"/>
+            </a:solidFill>
+            <a:headEnd w="sm" len="sm"/>
+            <a:tailEnd type="triangle" w="med" len="med"/>
+          </a:ln>
+        </p:spPr>
+        <p:style>
+          <a:lnRef idx="1">
+            <a:schemeClr val="accent1"/>
+          </a:lnRef>
+          <a:fillRef idx="0">
+            <a:schemeClr val="accent1"/>
+          </a:fillRef>
+          <a:effectRef idx="0">
+            <a:schemeClr val="accent1"/>
+          </a:effectRef>
+          <a:fontRef idx="minor">
+            <a:schemeClr val="tx1"/>
+          </a:fontRef>
+        </p:style>
+      </p:cxnSp>
+      <p:cxnSp>
+        <p:nvCxnSpPr>
+          <p:cNvPr id="14" name="Straight Arrow Connector 13"/>
+          <p:cNvCxnSpPr/>
+          <p:nvPr/>
+        </p:nvCxnSpPr>
+        <p:spPr>
+          <a:xfrm>
+            <a:off x="2562037" y="296659"/>
+            <a:ext cx="0" cy="342930"/>
+          </a:xfrm>
+          <a:prstGeom prst="straightConnector1">
+            <a:avLst/>
+          </a:prstGeom>
+          <a:ln w="12700">
+            <a:solidFill>
+              <a:schemeClr val="tx1"/>
+            </a:solidFill>
+            <a:headEnd w="sm" len="sm"/>
+            <a:tailEnd type="triangle" w="med" len="med"/>
+          </a:ln>
+        </p:spPr>
+        <p:style>
+          <a:lnRef idx="1">
+            <a:schemeClr val="accent1"/>
+          </a:lnRef>
+          <a:fillRef idx="0">
+            <a:schemeClr val="accent1"/>
+          </a:fillRef>
+          <a:effectRef idx="0">
+            <a:schemeClr val="accent1"/>
+          </a:effectRef>
+          <a:fontRef idx="minor">
+            <a:schemeClr val="tx1"/>
+          </a:fontRef>
+        </p:style>
+      </p:cxnSp>
+      <p:cxnSp>
+        <p:nvCxnSpPr>
+          <p:cNvPr id="15" name="Straight Arrow Connector 14"/>
+          <p:cNvCxnSpPr/>
+          <p:nvPr/>
+        </p:nvCxnSpPr>
+        <p:spPr>
+          <a:xfrm>
+            <a:off x="2441906" y="577633"/>
+            <a:ext cx="422455" cy="440627"/>
+          </a:xfrm>
+          <a:prstGeom prst="straightConnector1">
+            <a:avLst/>
+          </a:prstGeom>
+          <a:ln w="12700">
+            <a:solidFill>
+              <a:srgbClr val="E31A1C"/>
+            </a:solidFill>
+            <a:headEnd w="sm" len="sm"/>
+            <a:tailEnd type="triangle" w="med" len="med"/>
+          </a:ln>
+        </p:spPr>
+        <p:style>
+          <a:lnRef idx="1">
+            <a:schemeClr val="accent1"/>
+          </a:lnRef>
+          <a:fillRef idx="0">
+            <a:schemeClr val="accent1"/>
+          </a:fillRef>
+          <a:effectRef idx="0">
+            <a:schemeClr val="accent1"/>
+          </a:effectRef>
+          <a:fontRef idx="minor">
+            <a:schemeClr val="tx1"/>
+          </a:fontRef>
+        </p:style>
+      </p:cxnSp>
+      <p:cxnSp>
+        <p:nvCxnSpPr>
+          <p:cNvPr id="16" name="Straight Arrow Connector 15"/>
+          <p:cNvCxnSpPr/>
+          <p:nvPr/>
+        </p:nvCxnSpPr>
+        <p:spPr>
+          <a:xfrm flipV="1">
+            <a:off x="2864361" y="639531"/>
+            <a:ext cx="1016065" cy="378729"/>
+          </a:xfrm>
+          <a:prstGeom prst="straightConnector1">
+            <a:avLst/>
+          </a:prstGeom>
+          <a:ln w="12700">
+            <a:solidFill>
+              <a:srgbClr val="33A02C"/>
+            </a:solidFill>
+            <a:headEnd w="sm" len="sm"/>
+            <a:tailEnd type="triangle" w="med" len="med"/>
+          </a:ln>
+        </p:spPr>
+        <p:style>
+          <a:lnRef idx="1">
+            <a:schemeClr val="accent1"/>
+          </a:lnRef>
+          <a:fillRef idx="0">
+            <a:schemeClr val="accent1"/>
+          </a:fillRef>
+          <a:effectRef idx="0">
+            <a:schemeClr val="accent1"/>
+          </a:effectRef>
+          <a:fontRef idx="minor">
+            <a:schemeClr val="tx1"/>
+          </a:fontRef>
+        </p:style>
+      </p:cxnSp>
+      <p:sp>
+        <p:nvSpPr>
+          <p:cNvPr id="17" name="Rectangle 16"/>
+          <p:cNvSpPr/>
+          <p:nvPr/>
+        </p:nvSpPr>
+        <p:spPr>
+          <a:xfrm>
+            <a:off x="1744838" y="1056464"/>
+            <a:ext cx="743462" cy="200529"/>
+          </a:xfrm>
+          <a:prstGeom prst="rect">
+            <a:avLst/>
+          </a:prstGeom>
+          <a:noFill/>
+          <a:ln>
+            <a:noFill/>
+          </a:ln>
+        </p:spPr>
+        <p:style>
+          <a:lnRef idx="2">
+            <a:schemeClr val="accent2">
+              <a:shade val="50000"/>
+            </a:schemeClr>
+          </a:lnRef>
+          <a:fillRef idx="1">
+            <a:schemeClr val="accent2"/>
+          </a:fillRef>
+          <a:effectRef idx="0">
+            <a:schemeClr val="accent2"/>
+          </a:effectRef>
+          <a:fontRef idx="minor">
+            <a:schemeClr val="lt1"/>
+          </a:fontRef>
+        </p:style>
+        <p:txBody>
+          <a:bodyPr rtlCol="0" anchor="ctr"/>
+          <a:lstStyle/>
+          <a:p>
+            <a:pPr algn="ctr"/>
+            <a:r>
+              <a:rPr lang="en-US" sz="800" dirty="0" smtClean="0">
+                <a:solidFill>
+                  <a:schemeClr val="tx1"/>
+                </a:solidFill>
+                <a:latin typeface="Arial" pitchFamily="34" charset="0"/>
+                <a:cs typeface="Arial" pitchFamily="34" charset="0"/>
+              </a:rPr>
+              <a:t>perform monitoring</a:t>
+            </a:r>
+            <a:endParaRPr lang="en-US" sz="800" dirty="0">
+              <a:solidFill>
+                <a:schemeClr val="tx1"/>
+              </a:solidFill>
+              <a:latin typeface="Arial" pitchFamily="34" charset="0"/>
+              <a:cs typeface="Arial" pitchFamily="34" charset="0"/>
+            </a:endParaRPr>
+          </a:p>
+        </p:txBody>
+      </p:sp>
+      <p:sp>
+        <p:nvSpPr>
+          <p:cNvPr id="18" name="Rectangle 17"/>
+          <p:cNvSpPr/>
+          <p:nvPr/>
+        </p:nvSpPr>
+        <p:spPr>
+          <a:xfrm>
+            <a:off x="2649581" y="1056464"/>
+            <a:ext cx="729695" cy="200529"/>
+          </a:xfrm>
+          <a:prstGeom prst="rect">
+            <a:avLst/>
+          </a:prstGeom>
+          <a:noFill/>
+          <a:ln>
+            <a:noFill/>
+          </a:ln>
+        </p:spPr>
+        <p:style>
+          <a:lnRef idx="2">
+            <a:schemeClr val="accent2">
+              <a:shade val="50000"/>
+            </a:schemeClr>
+          </a:lnRef>
+          <a:fillRef idx="1">
+            <a:schemeClr val="accent2"/>
+          </a:fillRef>
+          <a:effectRef idx="0">
+            <a:schemeClr val="accent2"/>
+          </a:effectRef>
+          <a:fontRef idx="minor">
+            <a:schemeClr val="lt1"/>
+          </a:fontRef>
+        </p:style>
+        <p:txBody>
+          <a:bodyPr rtlCol="0" anchor="ctr"/>
+          <a:lstStyle/>
+          <a:p>
+            <a:pPr algn="ctr"/>
+            <a:r>
+              <a:rPr lang="en-US" sz="800" dirty="0" smtClean="0">
+                <a:solidFill>
+                  <a:schemeClr val="tx1"/>
+                </a:solidFill>
+                <a:latin typeface="Arial" pitchFamily="34" charset="0"/>
+                <a:cs typeface="Arial" pitchFamily="34" charset="0"/>
+              </a:rPr>
+              <a:t>drop monitoring</a:t>
+            </a:r>
+            <a:endParaRPr lang="en-US" sz="800" dirty="0">
+              <a:solidFill>
+                <a:schemeClr val="tx1"/>
+              </a:solidFill>
+              <a:latin typeface="Arial" pitchFamily="34" charset="0"/>
+              <a:cs typeface="Arial" pitchFamily="34" charset="0"/>
+            </a:endParaRPr>
+          </a:p>
+        </p:txBody>
+      </p:sp>
+      <p:sp>
+        <p:nvSpPr>
+          <p:cNvPr id="19" name="Rectangle 18"/>
+          <p:cNvSpPr/>
+          <p:nvPr/>
+        </p:nvSpPr>
+        <p:spPr>
+          <a:xfrm>
+            <a:off x="3328989" y="1056463"/>
+            <a:ext cx="743462" cy="200529"/>
+          </a:xfrm>
+          <a:prstGeom prst="rect">
+            <a:avLst/>
+          </a:prstGeom>
+          <a:noFill/>
+          <a:ln>
+            <a:noFill/>
+          </a:ln>
+        </p:spPr>
+        <p:style>
+          <a:lnRef idx="2">
+            <a:schemeClr val="accent2">
+              <a:shade val="50000"/>
+            </a:schemeClr>
+          </a:lnRef>
+          <a:fillRef idx="1">
+            <a:schemeClr val="accent2"/>
+          </a:fillRef>
+          <a:effectRef idx="0">
+            <a:schemeClr val="accent2"/>
+          </a:effectRef>
+          <a:fontRef idx="minor">
+            <a:schemeClr val="lt1"/>
+          </a:fontRef>
+        </p:style>
+        <p:txBody>
+          <a:bodyPr rtlCol="0" anchor="ctr"/>
+          <a:lstStyle/>
+          <a:p>
+            <a:pPr algn="ctr"/>
+            <a:r>
+              <a:rPr lang="en-US" sz="800" dirty="0" smtClean="0">
+                <a:solidFill>
+                  <a:schemeClr val="tx1"/>
+                </a:solidFill>
+                <a:latin typeface="Arial" pitchFamily="34" charset="0"/>
+                <a:cs typeface="Arial" pitchFamily="34" charset="0"/>
+              </a:rPr>
+              <a:t>perform monitoring</a:t>
+            </a:r>
+            <a:endParaRPr lang="en-US" sz="800" dirty="0">
+              <a:solidFill>
+                <a:schemeClr val="tx1"/>
+              </a:solidFill>
+              <a:latin typeface="Arial" pitchFamily="34" charset="0"/>
+              <a:cs typeface="Arial" pitchFamily="34" charset="0"/>
+            </a:endParaRPr>
+          </a:p>
+        </p:txBody>
+      </p:sp>
+    </p:spTree>
+    <p:extLst>
+      <p:ext uri="{BB962C8B-B14F-4D97-AF65-F5344CB8AC3E}">
+        <p14:creationId xmlns:p14="http://schemas.microsoft.com/office/powerpoint/2010/main" val="2149328717"/>
+      </p:ext>
+    </p:extLst>
+  </p:cSld>
+  <p:clrMapOvr>
+    <a:masterClrMapping/>
+  </p:clrMapOvr>
+</p:sld>
+</file>
+
+<file path=ppt/slides/slide7.xml><?xml version="1.0" encoding="utf-8"?>
+<p:sld xmlns:a="http://schemas.openxmlformats.org/drawingml/2006/main" xmlns:r="http://schemas.openxmlformats.org/officeDocument/2006/relationships" xmlns:p="http://schemas.openxmlformats.org/presentationml/2006/main">
+  <p:cSld>
+    <p:spTree>
+      <p:nvGrpSpPr>
+        <p:cNvPr id="1" name=""/>
+        <p:cNvGrpSpPr/>
+        <p:nvPr/>
+      </p:nvGrpSpPr>
+      <p:grpSpPr>
+        <a:xfrm>
+          <a:off x="0" y="0"/>
+          <a:ext cx="0" cy="0"/>
+          <a:chOff x="0" y="0"/>
+          <a:chExt cx="0" cy="0"/>
+        </a:xfrm>
+      </p:grpSpPr>
+      <p:sp>
+        <p:nvSpPr>
+          <p:cNvPr id="2" name="Oval 1"/>
+          <p:cNvSpPr/>
+          <p:nvPr/>
+        </p:nvSpPr>
+        <p:spPr>
+          <a:xfrm>
+            <a:off x="1600925" y="59789"/>
+            <a:ext cx="230429" cy="230429"/>
+          </a:xfrm>
+          <a:prstGeom prst="ellipse">
+            <a:avLst/>
+          </a:prstGeom>
+          <a:solidFill>
+            <a:srgbClr val="A6CEE3"/>
+          </a:solidFill>
+          <a:ln w="12700">
+            <a:solidFill>
+              <a:schemeClr val="tx1"/>
+            </a:solidFill>
+          </a:ln>
+        </p:spPr>
+        <p:style>
+          <a:lnRef idx="2">
+            <a:schemeClr val="accent1">
+              <a:shade val="50000"/>
+            </a:schemeClr>
+          </a:lnRef>
+          <a:fillRef idx="1">
+            <a:schemeClr val="accent1"/>
+          </a:fillRef>
+          <a:effectRef idx="0">
+            <a:schemeClr val="accent1"/>
+          </a:effectRef>
+          <a:fontRef idx="minor">
+            <a:schemeClr val="lt1"/>
+          </a:fontRef>
+        </p:style>
+        <p:txBody>
+          <a:bodyPr rtlCol="0" anchor="ctr"/>
+          <a:lstStyle/>
+          <a:p>
+            <a:pPr algn="ctr"/>
+            <a:r>
+              <a:rPr lang="en-US" sz="800" dirty="0" smtClean="0">
+                <a:solidFill>
+                  <a:schemeClr val="tx1"/>
+                </a:solidFill>
+                <a:latin typeface="Arial" pitchFamily="34" charset="0"/>
+                <a:cs typeface="Arial" pitchFamily="34" charset="0"/>
+              </a:rPr>
+              <a:t>A</a:t>
+            </a:r>
+            <a:endParaRPr lang="en-US" sz="800" dirty="0">
+              <a:solidFill>
+                <a:schemeClr val="tx1"/>
+              </a:solidFill>
+              <a:latin typeface="Arial" pitchFamily="34" charset="0"/>
+              <a:cs typeface="Arial" pitchFamily="34" charset="0"/>
+            </a:endParaRPr>
+          </a:p>
+        </p:txBody>
+      </p:sp>
+      <p:sp>
+        <p:nvSpPr>
+          <p:cNvPr id="3" name="Oval 2"/>
+          <p:cNvSpPr/>
+          <p:nvPr/>
+        </p:nvSpPr>
+        <p:spPr>
+          <a:xfrm>
+            <a:off x="2073847" y="59791"/>
+            <a:ext cx="230429" cy="230429"/>
+          </a:xfrm>
+          <a:prstGeom prst="ellipse">
+            <a:avLst/>
+          </a:prstGeom>
+          <a:solidFill>
+            <a:srgbClr val="A6CEE3"/>
+          </a:solidFill>
+          <a:ln w="12700">
+            <a:solidFill>
+              <a:schemeClr val="tx1"/>
+            </a:solidFill>
+          </a:ln>
+        </p:spPr>
+        <p:style>
+          <a:lnRef idx="2">
+            <a:schemeClr val="accent1">
+              <a:shade val="50000"/>
+            </a:schemeClr>
+          </a:lnRef>
+          <a:fillRef idx="1">
+            <a:schemeClr val="accent1"/>
+          </a:fillRef>
+          <a:effectRef idx="0">
+            <a:schemeClr val="accent1"/>
+          </a:effectRef>
+          <a:fontRef idx="minor">
+            <a:schemeClr val="lt1"/>
+          </a:fontRef>
+        </p:style>
+        <p:txBody>
+          <a:bodyPr rtlCol="0" anchor="ctr"/>
+          <a:lstStyle/>
+          <a:p>
+            <a:pPr algn="ctr"/>
+            <a:r>
+              <a:rPr lang="en-US" sz="800" dirty="0" smtClean="0">
+                <a:solidFill>
+                  <a:schemeClr val="tx1"/>
+                </a:solidFill>
+                <a:latin typeface="Arial" pitchFamily="34" charset="0"/>
+                <a:cs typeface="Arial" pitchFamily="34" charset="0"/>
+              </a:rPr>
+              <a:t>B</a:t>
+            </a:r>
+            <a:endParaRPr lang="en-US" sz="800" dirty="0">
+              <a:solidFill>
+                <a:schemeClr val="tx1"/>
+              </a:solidFill>
+              <a:latin typeface="Arial" pitchFamily="34" charset="0"/>
+              <a:cs typeface="Arial" pitchFamily="34" charset="0"/>
+            </a:endParaRPr>
+          </a:p>
+        </p:txBody>
+      </p:sp>
+      <p:cxnSp>
+        <p:nvCxnSpPr>
+          <p:cNvPr id="4" name="Straight Arrow Connector 3"/>
+          <p:cNvCxnSpPr>
+            <a:stCxn id="2" idx="6"/>
+            <a:endCxn id="3" idx="2"/>
+          </p:cNvCxnSpPr>
+          <p:nvPr/>
+        </p:nvCxnSpPr>
+        <p:spPr>
+          <a:xfrm>
+            <a:off x="1831354" y="175004"/>
+            <a:ext cx="242493" cy="2"/>
+          </a:xfrm>
+          <a:prstGeom prst="straightConnector1">
+            <a:avLst/>
+          </a:prstGeom>
+          <a:ln w="12700">
+            <a:solidFill>
+              <a:schemeClr val="tx1"/>
+            </a:solidFill>
+            <a:headEnd w="sm" len="sm"/>
+            <a:tailEnd type="triangle" w="med" len="med"/>
+          </a:ln>
+        </p:spPr>
+        <p:style>
+          <a:lnRef idx="1">
+            <a:schemeClr val="accent1"/>
+          </a:lnRef>
+          <a:fillRef idx="0">
+            <a:schemeClr val="accent1"/>
+          </a:fillRef>
+          <a:effectRef idx="0">
+            <a:schemeClr val="accent1"/>
+          </a:effectRef>
+          <a:fontRef idx="minor">
+            <a:schemeClr val="tx1"/>
+          </a:fontRef>
+        </p:style>
+      </p:cxnSp>
+      <p:sp>
+        <p:nvSpPr>
+          <p:cNvPr id="5" name="Oval 4"/>
+          <p:cNvSpPr/>
+          <p:nvPr/>
+        </p:nvSpPr>
+        <p:spPr>
+          <a:xfrm>
+            <a:off x="2546769" y="60111"/>
+            <a:ext cx="230429" cy="230429"/>
+          </a:xfrm>
+          <a:prstGeom prst="ellipse">
+            <a:avLst/>
+          </a:prstGeom>
+          <a:solidFill>
+            <a:srgbClr val="A6CEE3"/>
+          </a:solidFill>
+          <a:ln w="12700">
+            <a:solidFill>
+              <a:schemeClr val="tx1"/>
+            </a:solidFill>
+          </a:ln>
+        </p:spPr>
+        <p:style>
+          <a:lnRef idx="2">
+            <a:schemeClr val="accent1">
+              <a:shade val="50000"/>
+            </a:schemeClr>
+          </a:lnRef>
+          <a:fillRef idx="1">
+            <a:schemeClr val="accent1"/>
+          </a:fillRef>
+          <a:effectRef idx="0">
+            <a:schemeClr val="accent1"/>
+          </a:effectRef>
+          <a:fontRef idx="minor">
+            <a:schemeClr val="lt1"/>
+          </a:fontRef>
+        </p:style>
+        <p:txBody>
+          <a:bodyPr rtlCol="0" anchor="ctr"/>
+          <a:lstStyle/>
+          <a:p>
+            <a:pPr algn="ctr"/>
+            <a:r>
+              <a:rPr lang="en-US" sz="800" dirty="0" smtClean="0">
+                <a:solidFill>
+                  <a:schemeClr val="tx1"/>
+                </a:solidFill>
+                <a:latin typeface="Arial" pitchFamily="34" charset="0"/>
+                <a:cs typeface="Arial" pitchFamily="34" charset="0"/>
+              </a:rPr>
+              <a:t>C</a:t>
+            </a:r>
+            <a:endParaRPr lang="en-US" sz="800" dirty="0">
+              <a:solidFill>
+                <a:schemeClr val="tx1"/>
+              </a:solidFill>
+              <a:latin typeface="Arial" pitchFamily="34" charset="0"/>
+              <a:cs typeface="Arial" pitchFamily="34" charset="0"/>
+            </a:endParaRPr>
+          </a:p>
+        </p:txBody>
+      </p:sp>
+      <p:cxnSp>
+        <p:nvCxnSpPr>
+          <p:cNvPr id="6" name="Straight Arrow Connector 5"/>
+          <p:cNvCxnSpPr/>
+          <p:nvPr/>
+        </p:nvCxnSpPr>
+        <p:spPr>
+          <a:xfrm>
+            <a:off x="2304276" y="175329"/>
+            <a:ext cx="242493" cy="2"/>
+          </a:xfrm>
+          <a:prstGeom prst="straightConnector1">
+            <a:avLst/>
+          </a:prstGeom>
+          <a:ln w="12700">
+            <a:solidFill>
+              <a:schemeClr val="tx1"/>
+            </a:solidFill>
+            <a:headEnd w="sm" len="sm"/>
+            <a:tailEnd type="triangle" w="med" len="med"/>
+          </a:ln>
+        </p:spPr>
+        <p:style>
+          <a:lnRef idx="1">
+            <a:schemeClr val="accent1"/>
+          </a:lnRef>
+          <a:fillRef idx="0">
+            <a:schemeClr val="accent1"/>
+          </a:fillRef>
+          <a:effectRef idx="0">
+            <a:schemeClr val="accent1"/>
+          </a:effectRef>
+          <a:fontRef idx="minor">
+            <a:schemeClr val="tx1"/>
+          </a:fontRef>
+        </p:style>
+      </p:cxnSp>
+      <p:sp>
+        <p:nvSpPr>
+          <p:cNvPr id="7" name="Oval 6"/>
+          <p:cNvSpPr/>
+          <p:nvPr/>
+        </p:nvSpPr>
+        <p:spPr>
+          <a:xfrm>
+            <a:off x="3019691" y="60111"/>
+            <a:ext cx="230429" cy="230429"/>
+          </a:xfrm>
+          <a:prstGeom prst="ellipse">
+            <a:avLst/>
+          </a:prstGeom>
+          <a:solidFill>
+            <a:srgbClr val="A6CEE3"/>
+          </a:solidFill>
+          <a:ln w="12700">
+            <a:solidFill>
+              <a:schemeClr val="tx1"/>
+            </a:solidFill>
+          </a:ln>
+        </p:spPr>
+        <p:style>
+          <a:lnRef idx="2">
+            <a:schemeClr val="accent1">
+              <a:shade val="50000"/>
+            </a:schemeClr>
+          </a:lnRef>
+          <a:fillRef idx="1">
+            <a:schemeClr val="accent1"/>
+          </a:fillRef>
+          <a:effectRef idx="0">
+            <a:schemeClr val="accent1"/>
+          </a:effectRef>
+          <a:fontRef idx="minor">
+            <a:schemeClr val="lt1"/>
+          </a:fontRef>
+        </p:style>
+        <p:txBody>
+          <a:bodyPr rtlCol="0" anchor="ctr"/>
+          <a:lstStyle/>
+          <a:p>
+            <a:pPr algn="ctr"/>
+            <a:r>
+              <a:rPr lang="en-US" sz="800" dirty="0">
+                <a:solidFill>
+                  <a:schemeClr val="tx1"/>
+                </a:solidFill>
+                <a:latin typeface="Arial" pitchFamily="34" charset="0"/>
+                <a:cs typeface="Arial" pitchFamily="34" charset="0"/>
+              </a:rPr>
+              <a:t>D</a:t>
+            </a:r>
+          </a:p>
+        </p:txBody>
+      </p:sp>
+      <p:cxnSp>
+        <p:nvCxnSpPr>
+          <p:cNvPr id="8" name="Straight Arrow Connector 7"/>
+          <p:cNvCxnSpPr/>
+          <p:nvPr/>
+        </p:nvCxnSpPr>
+        <p:spPr>
+          <a:xfrm>
+            <a:off x="2777198" y="175327"/>
+            <a:ext cx="242493" cy="2"/>
+          </a:xfrm>
+          <a:prstGeom prst="straightConnector1">
+            <a:avLst/>
+          </a:prstGeom>
+          <a:ln w="12700">
+            <a:solidFill>
+              <a:schemeClr val="tx1"/>
+            </a:solidFill>
+            <a:headEnd w="sm" len="sm"/>
+            <a:tailEnd type="triangle" w="med" len="med"/>
+          </a:ln>
+        </p:spPr>
+        <p:style>
+          <a:lnRef idx="1">
+            <a:schemeClr val="accent1"/>
+          </a:lnRef>
+          <a:fillRef idx="0">
+            <a:schemeClr val="accent1"/>
+          </a:fillRef>
+          <a:effectRef idx="0">
+            <a:schemeClr val="accent1"/>
+          </a:effectRef>
+          <a:fontRef idx="minor">
+            <a:schemeClr val="tx1"/>
+          </a:fontRef>
+        </p:style>
+      </p:cxnSp>
+      <p:cxnSp>
+        <p:nvCxnSpPr>
+          <p:cNvPr id="9" name="Straight Arrow Connector 8"/>
+          <p:cNvCxnSpPr/>
+          <p:nvPr/>
+        </p:nvCxnSpPr>
+        <p:spPr>
+          <a:xfrm>
+            <a:off x="3250120" y="175325"/>
+            <a:ext cx="242493" cy="2"/>
+          </a:xfrm>
+          <a:prstGeom prst="straightConnector1">
+            <a:avLst/>
+          </a:prstGeom>
+          <a:ln w="12700">
+            <a:solidFill>
+              <a:schemeClr val="tx1"/>
+            </a:solidFill>
+            <a:headEnd w="sm" len="sm"/>
+            <a:tailEnd type="triangle" w="med" len="med"/>
+          </a:ln>
+        </p:spPr>
+        <p:style>
+          <a:lnRef idx="1">
+            <a:schemeClr val="accent1"/>
+          </a:lnRef>
+          <a:fillRef idx="0">
+            <a:schemeClr val="accent1"/>
+          </a:fillRef>
+          <a:effectRef idx="0">
+            <a:schemeClr val="accent1"/>
+          </a:effectRef>
+          <a:fontRef idx="minor">
+            <a:schemeClr val="tx1"/>
+          </a:fontRef>
+        </p:style>
+      </p:cxnSp>
+      <p:sp>
+        <p:nvSpPr>
+          <p:cNvPr id="10" name="Oval 9"/>
+          <p:cNvSpPr/>
+          <p:nvPr/>
+        </p:nvSpPr>
+        <p:spPr>
+          <a:xfrm>
+            <a:off x="2546768" y="357609"/>
+            <a:ext cx="230429" cy="230429"/>
+          </a:xfrm>
+          <a:prstGeom prst="ellipse">
+            <a:avLst/>
+          </a:prstGeom>
+          <a:solidFill>
+            <a:srgbClr val="A6CEE3"/>
+          </a:solidFill>
+          <a:ln w="12700">
+            <a:solidFill>
+              <a:schemeClr val="tx1"/>
+            </a:solidFill>
+          </a:ln>
+        </p:spPr>
+        <p:style>
+          <a:lnRef idx="2">
+            <a:schemeClr val="accent1">
+              <a:shade val="50000"/>
+            </a:schemeClr>
+          </a:lnRef>
+          <a:fillRef idx="1">
+            <a:schemeClr val="accent1"/>
+          </a:fillRef>
+          <a:effectRef idx="0">
+            <a:schemeClr val="accent1"/>
+          </a:effectRef>
+          <a:fontRef idx="minor">
+            <a:schemeClr val="lt1"/>
+          </a:fontRef>
+        </p:style>
+        <p:txBody>
+          <a:bodyPr rtlCol="0" anchor="ctr"/>
+          <a:lstStyle/>
+          <a:p>
+            <a:pPr algn="ctr"/>
+            <a:r>
+              <a:rPr lang="en-US" sz="800" dirty="0">
+                <a:solidFill>
+                  <a:schemeClr val="tx1"/>
+                </a:solidFill>
+                <a:latin typeface="Arial" pitchFamily="34" charset="0"/>
+                <a:cs typeface="Arial" pitchFamily="34" charset="0"/>
+              </a:rPr>
+              <a:t>F</a:t>
+            </a:r>
+          </a:p>
+        </p:txBody>
+      </p:sp>
+      <p:cxnSp>
+        <p:nvCxnSpPr>
+          <p:cNvPr id="11" name="Straight Arrow Connector 10"/>
+          <p:cNvCxnSpPr>
+            <a:stCxn id="3" idx="5"/>
+            <a:endCxn id="10" idx="2"/>
+          </p:cNvCxnSpPr>
+          <p:nvPr/>
+        </p:nvCxnSpPr>
+        <p:spPr>
+          <a:xfrm>
+            <a:off x="2270530" y="256474"/>
+            <a:ext cx="276238" cy="216350"/>
+          </a:xfrm>
+          <a:prstGeom prst="straightConnector1">
+            <a:avLst/>
+          </a:prstGeom>
+          <a:ln w="12700">
+            <a:solidFill>
+              <a:schemeClr val="tx1"/>
+            </a:solidFill>
+            <a:headEnd w="sm" len="sm"/>
+            <a:tailEnd type="triangle" w="med" len="med"/>
+          </a:ln>
+        </p:spPr>
+        <p:style>
+          <a:lnRef idx="1">
+            <a:schemeClr val="accent1"/>
+          </a:lnRef>
+          <a:fillRef idx="0">
+            <a:schemeClr val="accent1"/>
+          </a:fillRef>
+          <a:effectRef idx="0">
+            <a:schemeClr val="accent1"/>
+          </a:effectRef>
+          <a:fontRef idx="minor">
+            <a:schemeClr val="tx1"/>
+          </a:fontRef>
+        </p:style>
+      </p:cxnSp>
+      <p:cxnSp>
+        <p:nvCxnSpPr>
+          <p:cNvPr id="12" name="Straight Arrow Connector 11"/>
+          <p:cNvCxnSpPr/>
+          <p:nvPr/>
+        </p:nvCxnSpPr>
+        <p:spPr>
+          <a:xfrm>
+            <a:off x="2780750" y="472824"/>
+            <a:ext cx="242493" cy="2"/>
+          </a:xfrm>
+          <a:prstGeom prst="straightConnector1">
+            <a:avLst/>
+          </a:prstGeom>
+          <a:ln w="12700">
+            <a:solidFill>
+              <a:schemeClr val="tx1"/>
+            </a:solidFill>
+            <a:headEnd w="sm" len="sm"/>
+            <a:tailEnd type="triangle" w="med" len="med"/>
+          </a:ln>
+        </p:spPr>
+        <p:style>
+          <a:lnRef idx="1">
+            <a:schemeClr val="accent1"/>
+          </a:lnRef>
+          <a:fillRef idx="0">
+            <a:schemeClr val="accent1"/>
+          </a:fillRef>
+          <a:effectRef idx="0">
+            <a:schemeClr val="accent1"/>
+          </a:effectRef>
+          <a:fontRef idx="minor">
+            <a:schemeClr val="tx1"/>
+          </a:fontRef>
+        </p:style>
+      </p:cxnSp>
+      <p:sp>
+        <p:nvSpPr>
+          <p:cNvPr id="13" name="Rectangle 12"/>
+          <p:cNvSpPr/>
+          <p:nvPr/>
+        </p:nvSpPr>
+        <p:spPr>
+          <a:xfrm>
+            <a:off x="3023243" y="357609"/>
+            <a:ext cx="230429" cy="230429"/>
+          </a:xfrm>
+          <a:prstGeom prst="rect">
+            <a:avLst/>
+          </a:prstGeom>
+          <a:solidFill>
+            <a:srgbClr val="A6CEE3"/>
+          </a:solidFill>
+          <a:ln w="12700">
+            <a:solidFill>
+              <a:schemeClr val="tx1"/>
+            </a:solidFill>
+          </a:ln>
+        </p:spPr>
+        <p:style>
+          <a:lnRef idx="2">
+            <a:schemeClr val="accent1">
+              <a:shade val="50000"/>
+            </a:schemeClr>
+          </a:lnRef>
+          <a:fillRef idx="1">
+            <a:schemeClr val="accent1"/>
+          </a:fillRef>
+          <a:effectRef idx="0">
+            <a:schemeClr val="accent1"/>
+          </a:effectRef>
+          <a:fontRef idx="minor">
+            <a:schemeClr val="lt1"/>
+          </a:fontRef>
+        </p:style>
+        <p:txBody>
+          <a:bodyPr rtlCol="0" anchor="ctr"/>
+          <a:lstStyle/>
+          <a:p>
+            <a:pPr algn="ctr"/>
+            <a:r>
+              <a:rPr lang="en-US" sz="800" dirty="0" smtClean="0">
+                <a:solidFill>
+                  <a:schemeClr val="tx1"/>
+                </a:solidFill>
+                <a:latin typeface="Arial" pitchFamily="34" charset="0"/>
+                <a:cs typeface="Arial" pitchFamily="34" charset="0"/>
+              </a:rPr>
+              <a:t>G</a:t>
+            </a:r>
+            <a:endParaRPr lang="en-US" sz="800" dirty="0">
+              <a:solidFill>
+                <a:schemeClr val="tx1"/>
+              </a:solidFill>
+              <a:latin typeface="Arial" pitchFamily="34" charset="0"/>
+              <a:cs typeface="Arial" pitchFamily="34" charset="0"/>
+            </a:endParaRPr>
+          </a:p>
+        </p:txBody>
+      </p:sp>
+      <p:sp>
+        <p:nvSpPr>
+          <p:cNvPr id="14" name="Rectangle 13"/>
+          <p:cNvSpPr/>
+          <p:nvPr/>
+        </p:nvSpPr>
+        <p:spPr>
+          <a:xfrm>
+            <a:off x="3492613" y="59788"/>
+            <a:ext cx="230429" cy="230429"/>
+          </a:xfrm>
+          <a:prstGeom prst="rect">
+            <a:avLst/>
+          </a:prstGeom>
+          <a:solidFill>
+            <a:srgbClr val="A6CEE3"/>
+          </a:solidFill>
+          <a:ln w="12700">
+            <a:solidFill>
+              <a:schemeClr val="tx1"/>
+            </a:solidFill>
+          </a:ln>
+        </p:spPr>
+        <p:style>
+          <a:lnRef idx="2">
+            <a:schemeClr val="accent1">
+              <a:shade val="50000"/>
+            </a:schemeClr>
+          </a:lnRef>
+          <a:fillRef idx="1">
+            <a:schemeClr val="accent1"/>
+          </a:fillRef>
+          <a:effectRef idx="0">
+            <a:schemeClr val="accent1"/>
+          </a:effectRef>
+          <a:fontRef idx="minor">
+            <a:schemeClr val="lt1"/>
+          </a:fontRef>
+        </p:style>
+        <p:txBody>
+          <a:bodyPr rtlCol="0" anchor="ctr"/>
+          <a:lstStyle/>
+          <a:p>
+            <a:pPr algn="ctr"/>
+            <a:r>
+              <a:rPr lang="en-US" sz="800" dirty="0" smtClean="0">
+                <a:solidFill>
+                  <a:schemeClr val="tx1"/>
+                </a:solidFill>
+                <a:latin typeface="Arial" pitchFamily="34" charset="0"/>
+                <a:cs typeface="Arial" pitchFamily="34" charset="0"/>
+              </a:rPr>
+              <a:t>E</a:t>
+            </a:r>
+            <a:endParaRPr lang="en-US" sz="800" dirty="0">
+              <a:solidFill>
+                <a:schemeClr val="tx1"/>
+              </a:solidFill>
+              <a:latin typeface="Arial" pitchFamily="34" charset="0"/>
+              <a:cs typeface="Arial" pitchFamily="34" charset="0"/>
+            </a:endParaRPr>
+          </a:p>
+        </p:txBody>
+      </p:sp>
+    </p:spTree>
+    <p:extLst>
+      <p:ext uri="{BB962C8B-B14F-4D97-AF65-F5344CB8AC3E}">
+        <p14:creationId xmlns:p14="http://schemas.microsoft.com/office/powerpoint/2010/main" val="3648215450"/>
+      </p:ext>
+    </p:extLst>
+  </p:cSld>
+  <p:clrMapOvr>
+    <a:masterClrMapping/>
+  </p:clrMapOvr>
+</p:sld>
+</file>
+
+<file path=ppt/slides/slide8.xml><?xml version="1.0" encoding="utf-8"?>
+<p:sld xmlns:a="http://schemas.openxmlformats.org/drawingml/2006/main" xmlns:r="http://schemas.openxmlformats.org/officeDocument/2006/relationships" xmlns:p="http://schemas.openxmlformats.org/presentationml/2006/main">
+  <p:cSld>
+    <p:spTree>
+      <p:nvGrpSpPr>
+        <p:cNvPr id="1" name=""/>
+        <p:cNvGrpSpPr/>
+        <p:nvPr/>
+      </p:nvGrpSpPr>
+      <p:grpSpPr>
+        <a:xfrm>
+          <a:off x="0" y="0"/>
+          <a:ext cx="0" cy="0"/>
+          <a:chOff x="0" y="0"/>
+          <a:chExt cx="0" cy="0"/>
+        </a:xfrm>
+      </p:grpSpPr>
+      <p:sp>
+        <p:nvSpPr>
+          <p:cNvPr id="2" name="Oval 1"/>
+          <p:cNvSpPr/>
+          <p:nvPr/>
+        </p:nvSpPr>
+        <p:spPr>
+          <a:xfrm>
+            <a:off x="1585119" y="45700"/>
+            <a:ext cx="230429" cy="230429"/>
+          </a:xfrm>
+          <a:prstGeom prst="ellipse">
+            <a:avLst/>
+          </a:prstGeom>
+          <a:solidFill>
+            <a:srgbClr val="A6CEE3"/>
+          </a:solidFill>
+          <a:ln w="12700">
+            <a:solidFill>
+              <a:schemeClr val="tx1"/>
+            </a:solidFill>
+          </a:ln>
+        </p:spPr>
+        <p:style>
+          <a:lnRef idx="2">
+            <a:schemeClr val="accent1">
+              <a:shade val="50000"/>
+            </a:schemeClr>
+          </a:lnRef>
+          <a:fillRef idx="1">
+            <a:schemeClr val="accent1"/>
+          </a:fillRef>
+          <a:effectRef idx="0">
+            <a:schemeClr val="accent1"/>
+          </a:effectRef>
+          <a:fontRef idx="minor">
+            <a:schemeClr val="lt1"/>
+          </a:fontRef>
+        </p:style>
+        <p:txBody>
+          <a:bodyPr rtlCol="0" anchor="ctr"/>
+          <a:lstStyle/>
+          <a:p>
+            <a:pPr algn="ctr"/>
+            <a:r>
+              <a:rPr lang="en-US" sz="800" dirty="0" smtClean="0">
+                <a:solidFill>
+                  <a:schemeClr val="tx1"/>
+                </a:solidFill>
+                <a:latin typeface="Arial" pitchFamily="34" charset="0"/>
+                <a:cs typeface="Arial" pitchFamily="34" charset="0"/>
+              </a:rPr>
+              <a:t>A</a:t>
+            </a:r>
+            <a:endParaRPr lang="en-US" sz="800" dirty="0">
+              <a:solidFill>
+                <a:schemeClr val="tx1"/>
+              </a:solidFill>
+              <a:latin typeface="Arial" pitchFamily="34" charset="0"/>
+              <a:cs typeface="Arial" pitchFamily="34" charset="0"/>
+            </a:endParaRPr>
+          </a:p>
+        </p:txBody>
+      </p:sp>
+      <p:sp>
+        <p:nvSpPr>
+          <p:cNvPr id="3" name="Oval 2"/>
+          <p:cNvSpPr/>
+          <p:nvPr/>
+        </p:nvSpPr>
+        <p:spPr>
+          <a:xfrm>
+            <a:off x="2058041" y="45702"/>
+            <a:ext cx="230429" cy="230429"/>
+          </a:xfrm>
+          <a:prstGeom prst="ellipse">
+            <a:avLst/>
+          </a:prstGeom>
+          <a:solidFill>
+            <a:srgbClr val="FFFFCC"/>
+          </a:solidFill>
+          <a:ln w="12700">
+            <a:solidFill>
+              <a:schemeClr val="tx1"/>
+            </a:solidFill>
+          </a:ln>
+        </p:spPr>
+        <p:style>
+          <a:lnRef idx="2">
+            <a:schemeClr val="accent1">
+              <a:shade val="50000"/>
+            </a:schemeClr>
+          </a:lnRef>
+          <a:fillRef idx="1">
+            <a:schemeClr val="accent1"/>
+          </a:fillRef>
+          <a:effectRef idx="0">
+            <a:schemeClr val="accent1"/>
+          </a:effectRef>
+          <a:fontRef idx="minor">
+            <a:schemeClr val="lt1"/>
+          </a:fontRef>
+        </p:style>
+        <p:txBody>
+          <a:bodyPr rtlCol="0" anchor="ctr"/>
+          <a:lstStyle/>
+          <a:p>
+            <a:pPr algn="ctr"/>
+            <a:r>
+              <a:rPr lang="en-US" sz="800" dirty="0" smtClean="0">
+                <a:solidFill>
+                  <a:schemeClr val="tx1"/>
+                </a:solidFill>
+                <a:latin typeface="Arial" pitchFamily="34" charset="0"/>
+                <a:cs typeface="Arial" pitchFamily="34" charset="0"/>
+              </a:rPr>
+              <a:t>B</a:t>
+            </a:r>
+            <a:endParaRPr lang="en-US" sz="800" dirty="0">
+              <a:solidFill>
+                <a:schemeClr val="tx1"/>
+              </a:solidFill>
+              <a:latin typeface="Arial" pitchFamily="34" charset="0"/>
+              <a:cs typeface="Arial" pitchFamily="34" charset="0"/>
+            </a:endParaRPr>
+          </a:p>
+        </p:txBody>
+      </p:sp>
+      <p:cxnSp>
+        <p:nvCxnSpPr>
+          <p:cNvPr id="4" name="Straight Arrow Connector 3"/>
+          <p:cNvCxnSpPr>
+            <a:stCxn id="2" idx="6"/>
+            <a:endCxn id="3" idx="2"/>
+          </p:cNvCxnSpPr>
+          <p:nvPr/>
+        </p:nvCxnSpPr>
+        <p:spPr>
+          <a:xfrm>
+            <a:off x="1815548" y="160915"/>
+            <a:ext cx="242493" cy="2"/>
+          </a:xfrm>
+          <a:prstGeom prst="straightConnector1">
+            <a:avLst/>
+          </a:prstGeom>
+          <a:ln w="12700">
+            <a:solidFill>
+              <a:schemeClr val="tx1"/>
+            </a:solidFill>
+            <a:headEnd w="sm" len="sm"/>
+            <a:tailEnd type="triangle" w="med" len="med"/>
+          </a:ln>
+        </p:spPr>
+        <p:style>
+          <a:lnRef idx="1">
+            <a:schemeClr val="accent1"/>
+          </a:lnRef>
+          <a:fillRef idx="0">
+            <a:schemeClr val="accent1"/>
+          </a:fillRef>
+          <a:effectRef idx="0">
+            <a:schemeClr val="accent1"/>
+          </a:effectRef>
+          <a:fontRef idx="minor">
+            <a:schemeClr val="tx1"/>
+          </a:fontRef>
+        </p:style>
+      </p:cxnSp>
+      <p:sp>
+        <p:nvSpPr>
+          <p:cNvPr id="5" name="Oval 4"/>
+          <p:cNvSpPr/>
+          <p:nvPr/>
+        </p:nvSpPr>
+        <p:spPr>
+          <a:xfrm>
+            <a:off x="2530963" y="46022"/>
+            <a:ext cx="230429" cy="230429"/>
+          </a:xfrm>
+          <a:prstGeom prst="ellipse">
+            <a:avLst/>
+          </a:prstGeom>
+          <a:solidFill>
+            <a:srgbClr val="FFFFCC"/>
+          </a:solidFill>
+          <a:ln w="12700">
+            <a:solidFill>
+              <a:schemeClr val="tx1"/>
+            </a:solidFill>
+          </a:ln>
+        </p:spPr>
+        <p:style>
+          <a:lnRef idx="2">
+            <a:schemeClr val="accent1">
+              <a:shade val="50000"/>
+            </a:schemeClr>
+          </a:lnRef>
+          <a:fillRef idx="1">
+            <a:schemeClr val="accent1"/>
+          </a:fillRef>
+          <a:effectRef idx="0">
+            <a:schemeClr val="accent1"/>
+          </a:effectRef>
+          <a:fontRef idx="minor">
+            <a:schemeClr val="lt1"/>
+          </a:fontRef>
+        </p:style>
+        <p:txBody>
+          <a:bodyPr rtlCol="0" anchor="ctr"/>
+          <a:lstStyle/>
+          <a:p>
+            <a:pPr algn="ctr"/>
+            <a:r>
+              <a:rPr lang="en-US" sz="800" dirty="0" smtClean="0">
+                <a:solidFill>
+                  <a:schemeClr val="tx1"/>
+                </a:solidFill>
+                <a:latin typeface="Arial" pitchFamily="34" charset="0"/>
+                <a:cs typeface="Arial" pitchFamily="34" charset="0"/>
+              </a:rPr>
+              <a:t>C</a:t>
+            </a:r>
+            <a:endParaRPr lang="en-US" sz="800" dirty="0">
+              <a:solidFill>
+                <a:schemeClr val="tx1"/>
+              </a:solidFill>
+              <a:latin typeface="Arial" pitchFamily="34" charset="0"/>
+              <a:cs typeface="Arial" pitchFamily="34" charset="0"/>
+            </a:endParaRPr>
+          </a:p>
+        </p:txBody>
+      </p:sp>
+      <p:cxnSp>
+        <p:nvCxnSpPr>
+          <p:cNvPr id="6" name="Straight Arrow Connector 5"/>
+          <p:cNvCxnSpPr/>
+          <p:nvPr/>
+        </p:nvCxnSpPr>
+        <p:spPr>
+          <a:xfrm>
+            <a:off x="2288470" y="161240"/>
+            <a:ext cx="242493" cy="2"/>
+          </a:xfrm>
+          <a:prstGeom prst="straightConnector1">
+            <a:avLst/>
+          </a:prstGeom>
+          <a:ln w="12700">
+            <a:solidFill>
+              <a:schemeClr val="tx1"/>
+            </a:solidFill>
+            <a:headEnd w="sm" len="sm"/>
+            <a:tailEnd type="triangle" w="med" len="med"/>
+          </a:ln>
+        </p:spPr>
+        <p:style>
+          <a:lnRef idx="1">
+            <a:schemeClr val="accent1"/>
+          </a:lnRef>
+          <a:fillRef idx="0">
+            <a:schemeClr val="accent1"/>
+          </a:fillRef>
+          <a:effectRef idx="0">
+            <a:schemeClr val="accent1"/>
+          </a:effectRef>
+          <a:fontRef idx="minor">
+            <a:schemeClr val="tx1"/>
+          </a:fontRef>
+        </p:style>
+      </p:cxnSp>
+      <p:sp>
+        <p:nvSpPr>
+          <p:cNvPr id="7" name="Oval 6"/>
+          <p:cNvSpPr/>
+          <p:nvPr/>
+        </p:nvSpPr>
+        <p:spPr>
+          <a:xfrm>
+            <a:off x="3003885" y="46022"/>
+            <a:ext cx="230429" cy="230429"/>
+          </a:xfrm>
+          <a:prstGeom prst="ellipse">
+            <a:avLst/>
+          </a:prstGeom>
+          <a:solidFill>
+            <a:srgbClr val="FFFFCC"/>
+          </a:solidFill>
+          <a:ln w="12700">
+            <a:solidFill>
+              <a:schemeClr val="tx1"/>
+            </a:solidFill>
+          </a:ln>
+        </p:spPr>
+        <p:style>
+          <a:lnRef idx="2">
+            <a:schemeClr val="accent1">
+              <a:shade val="50000"/>
+            </a:schemeClr>
+          </a:lnRef>
+          <a:fillRef idx="1">
+            <a:schemeClr val="accent1"/>
+          </a:fillRef>
+          <a:effectRef idx="0">
+            <a:schemeClr val="accent1"/>
+          </a:effectRef>
+          <a:fontRef idx="minor">
+            <a:schemeClr val="lt1"/>
+          </a:fontRef>
+        </p:style>
+        <p:txBody>
+          <a:bodyPr rtlCol="0" anchor="ctr"/>
+          <a:lstStyle/>
+          <a:p>
+            <a:pPr algn="ctr"/>
+            <a:r>
+              <a:rPr lang="en-US" sz="800" dirty="0">
+                <a:solidFill>
+                  <a:schemeClr val="tx1"/>
+                </a:solidFill>
+                <a:latin typeface="Arial" pitchFamily="34" charset="0"/>
+                <a:cs typeface="Arial" pitchFamily="34" charset="0"/>
+              </a:rPr>
+              <a:t>D</a:t>
+            </a:r>
+          </a:p>
+        </p:txBody>
+      </p:sp>
+      <p:cxnSp>
+        <p:nvCxnSpPr>
+          <p:cNvPr id="8" name="Straight Arrow Connector 7"/>
+          <p:cNvCxnSpPr/>
+          <p:nvPr/>
+        </p:nvCxnSpPr>
+        <p:spPr>
+          <a:xfrm>
+            <a:off x="2761392" y="161238"/>
+            <a:ext cx="242493" cy="2"/>
+          </a:xfrm>
+          <a:prstGeom prst="straightConnector1">
+            <a:avLst/>
+          </a:prstGeom>
+          <a:ln w="12700">
+            <a:solidFill>
+              <a:schemeClr val="tx1"/>
+            </a:solidFill>
+            <a:headEnd w="sm" len="sm"/>
+            <a:tailEnd type="triangle" w="med" len="med"/>
+          </a:ln>
+        </p:spPr>
+        <p:style>
+          <a:lnRef idx="1">
+            <a:schemeClr val="accent1"/>
+          </a:lnRef>
+          <a:fillRef idx="0">
+            <a:schemeClr val="accent1"/>
+          </a:fillRef>
+          <a:effectRef idx="0">
+            <a:schemeClr val="accent1"/>
+          </a:effectRef>
+          <a:fontRef idx="minor">
+            <a:schemeClr val="tx1"/>
+          </a:fontRef>
+        </p:style>
+      </p:cxnSp>
+      <p:cxnSp>
+        <p:nvCxnSpPr>
+          <p:cNvPr id="9" name="Straight Arrow Connector 8"/>
+          <p:cNvCxnSpPr/>
+          <p:nvPr/>
+        </p:nvCxnSpPr>
+        <p:spPr>
+          <a:xfrm>
+            <a:off x="3234314" y="161236"/>
+            <a:ext cx="242493" cy="2"/>
+          </a:xfrm>
+          <a:prstGeom prst="straightConnector1">
+            <a:avLst/>
+          </a:prstGeom>
+          <a:ln w="12700">
+            <a:solidFill>
+              <a:schemeClr val="tx1"/>
+            </a:solidFill>
+            <a:headEnd w="sm" len="sm"/>
+            <a:tailEnd type="triangle" w="med" len="med"/>
+          </a:ln>
+        </p:spPr>
+        <p:style>
+          <a:lnRef idx="1">
+            <a:schemeClr val="accent1"/>
+          </a:lnRef>
+          <a:fillRef idx="0">
+            <a:schemeClr val="accent1"/>
+          </a:fillRef>
+          <a:effectRef idx="0">
+            <a:schemeClr val="accent1"/>
+          </a:effectRef>
+          <a:fontRef idx="minor">
+            <a:schemeClr val="tx1"/>
+          </a:fontRef>
+        </p:style>
+      </p:cxnSp>
+      <p:sp>
+        <p:nvSpPr>
+          <p:cNvPr id="10" name="Oval 9"/>
+          <p:cNvSpPr/>
+          <p:nvPr/>
+        </p:nvSpPr>
+        <p:spPr>
+          <a:xfrm>
+            <a:off x="2530962" y="343520"/>
+            <a:ext cx="230429" cy="230429"/>
+          </a:xfrm>
+          <a:prstGeom prst="ellipse">
+            <a:avLst/>
+          </a:prstGeom>
+          <a:solidFill>
+            <a:srgbClr val="FFFFCC"/>
+          </a:solidFill>
+          <a:ln w="12700">
+            <a:solidFill>
+              <a:schemeClr val="tx1"/>
+            </a:solidFill>
+          </a:ln>
+        </p:spPr>
+        <p:style>
+          <a:lnRef idx="2">
+            <a:schemeClr val="accent1">
+              <a:shade val="50000"/>
+            </a:schemeClr>
+          </a:lnRef>
+          <a:fillRef idx="1">
+            <a:schemeClr val="accent1"/>
+          </a:fillRef>
+          <a:effectRef idx="0">
+            <a:schemeClr val="accent1"/>
+          </a:effectRef>
+          <a:fontRef idx="minor">
+            <a:schemeClr val="lt1"/>
+          </a:fontRef>
+        </p:style>
+        <p:txBody>
+          <a:bodyPr rtlCol="0" anchor="ctr"/>
+          <a:lstStyle/>
+          <a:p>
+            <a:pPr algn="ctr"/>
+            <a:r>
+              <a:rPr lang="en-US" sz="800" dirty="0">
+                <a:solidFill>
+                  <a:schemeClr val="tx1"/>
+                </a:solidFill>
+                <a:latin typeface="Arial" pitchFamily="34" charset="0"/>
+                <a:cs typeface="Arial" pitchFamily="34" charset="0"/>
+              </a:rPr>
+              <a:t>F</a:t>
+            </a:r>
+          </a:p>
+        </p:txBody>
+      </p:sp>
+      <p:cxnSp>
+        <p:nvCxnSpPr>
+          <p:cNvPr id="11" name="Straight Arrow Connector 10"/>
+          <p:cNvCxnSpPr>
+            <a:stCxn id="3" idx="5"/>
+            <a:endCxn id="10" idx="2"/>
+          </p:cNvCxnSpPr>
+          <p:nvPr/>
+        </p:nvCxnSpPr>
+        <p:spPr>
+          <a:xfrm>
+            <a:off x="2254724" y="242385"/>
+            <a:ext cx="276238" cy="216350"/>
+          </a:xfrm>
+          <a:prstGeom prst="straightConnector1">
+            <a:avLst/>
+          </a:prstGeom>
+          <a:ln w="12700">
+            <a:solidFill>
+              <a:schemeClr val="tx1"/>
+            </a:solidFill>
+            <a:headEnd w="sm" len="sm"/>
+            <a:tailEnd type="triangle" w="med" len="med"/>
+          </a:ln>
+        </p:spPr>
+        <p:style>
+          <a:lnRef idx="1">
+            <a:schemeClr val="accent1"/>
+          </a:lnRef>
+          <a:fillRef idx="0">
+            <a:schemeClr val="accent1"/>
+          </a:fillRef>
+          <a:effectRef idx="0">
+            <a:schemeClr val="accent1"/>
+          </a:effectRef>
+          <a:fontRef idx="minor">
+            <a:schemeClr val="tx1"/>
+          </a:fontRef>
+        </p:style>
+      </p:cxnSp>
+      <p:cxnSp>
+        <p:nvCxnSpPr>
+          <p:cNvPr id="12" name="Straight Arrow Connector 11"/>
+          <p:cNvCxnSpPr/>
+          <p:nvPr/>
+        </p:nvCxnSpPr>
+        <p:spPr>
+          <a:xfrm>
+            <a:off x="2764944" y="458735"/>
+            <a:ext cx="242493" cy="2"/>
+          </a:xfrm>
+          <a:prstGeom prst="straightConnector1">
+            <a:avLst/>
+          </a:prstGeom>
+          <a:ln w="12700">
+            <a:solidFill>
+              <a:schemeClr val="tx1"/>
+            </a:solidFill>
+            <a:headEnd w="sm" len="sm"/>
+            <a:tailEnd type="triangle" w="med" len="med"/>
+          </a:ln>
+        </p:spPr>
+        <p:style>
+          <a:lnRef idx="1">
+            <a:schemeClr val="accent1"/>
+          </a:lnRef>
+          <a:fillRef idx="0">
+            <a:schemeClr val="accent1"/>
+          </a:fillRef>
+          <a:effectRef idx="0">
+            <a:schemeClr val="accent1"/>
+          </a:effectRef>
+          <a:fontRef idx="minor">
+            <a:schemeClr val="tx1"/>
+          </a:fontRef>
+        </p:style>
+      </p:cxnSp>
+      <p:sp>
+        <p:nvSpPr>
+          <p:cNvPr id="13" name="Rectangle 12"/>
+          <p:cNvSpPr/>
+          <p:nvPr/>
+        </p:nvSpPr>
+        <p:spPr>
+          <a:xfrm>
+            <a:off x="3007437" y="343520"/>
+            <a:ext cx="230429" cy="230429"/>
+          </a:xfrm>
+          <a:prstGeom prst="rect">
+            <a:avLst/>
+          </a:prstGeom>
+          <a:solidFill>
+            <a:srgbClr val="FFFFCC"/>
+          </a:solidFill>
+          <a:ln w="12700">
+            <a:solidFill>
+              <a:schemeClr val="tx1"/>
+            </a:solidFill>
+          </a:ln>
+        </p:spPr>
+        <p:style>
+          <a:lnRef idx="2">
+            <a:schemeClr val="accent1">
+              <a:shade val="50000"/>
+            </a:schemeClr>
+          </a:lnRef>
+          <a:fillRef idx="1">
+            <a:schemeClr val="accent1"/>
+          </a:fillRef>
+          <a:effectRef idx="0">
+            <a:schemeClr val="accent1"/>
+          </a:effectRef>
+          <a:fontRef idx="minor">
+            <a:schemeClr val="lt1"/>
+          </a:fontRef>
+        </p:style>
+        <p:txBody>
+          <a:bodyPr rtlCol="0" anchor="ctr"/>
+          <a:lstStyle/>
+          <a:p>
+            <a:pPr algn="ctr"/>
+            <a:r>
+              <a:rPr lang="en-US" sz="800" dirty="0" smtClean="0">
+                <a:solidFill>
+                  <a:schemeClr val="tx1"/>
+                </a:solidFill>
+                <a:latin typeface="Arial" pitchFamily="34" charset="0"/>
+                <a:cs typeface="Arial" pitchFamily="34" charset="0"/>
+              </a:rPr>
+              <a:t>G</a:t>
+            </a:r>
+            <a:endParaRPr lang="en-US" sz="800" dirty="0">
+              <a:solidFill>
+                <a:schemeClr val="tx1"/>
+              </a:solidFill>
+              <a:latin typeface="Arial" pitchFamily="34" charset="0"/>
+              <a:cs typeface="Arial" pitchFamily="34" charset="0"/>
+            </a:endParaRPr>
+          </a:p>
+        </p:txBody>
+      </p:sp>
+      <p:sp>
+        <p:nvSpPr>
+          <p:cNvPr id="14" name="Rectangle 13"/>
+          <p:cNvSpPr/>
+          <p:nvPr/>
+        </p:nvSpPr>
+        <p:spPr>
+          <a:xfrm>
+            <a:off x="3476807" y="45699"/>
+            <a:ext cx="230429" cy="230429"/>
+          </a:xfrm>
+          <a:prstGeom prst="rect">
+            <a:avLst/>
+          </a:prstGeom>
+          <a:solidFill>
+            <a:srgbClr val="FFFFCC"/>
+          </a:solidFill>
+          <a:ln w="12700">
+            <a:solidFill>
+              <a:schemeClr val="tx1"/>
+            </a:solidFill>
+          </a:ln>
+        </p:spPr>
+        <p:style>
+          <a:lnRef idx="2">
+            <a:schemeClr val="accent1">
+              <a:shade val="50000"/>
+            </a:schemeClr>
+          </a:lnRef>
+          <a:fillRef idx="1">
+            <a:schemeClr val="accent1"/>
+          </a:fillRef>
+          <a:effectRef idx="0">
+            <a:schemeClr val="accent1"/>
+          </a:effectRef>
+          <a:fontRef idx="minor">
+            <a:schemeClr val="lt1"/>
+          </a:fontRef>
+        </p:style>
+        <p:txBody>
+          <a:bodyPr rtlCol="0" anchor="ctr"/>
+          <a:lstStyle/>
+          <a:p>
+            <a:pPr algn="ctr"/>
+            <a:r>
+              <a:rPr lang="en-US" sz="800" dirty="0" smtClean="0">
+                <a:solidFill>
+                  <a:schemeClr val="tx1"/>
+                </a:solidFill>
+                <a:latin typeface="Arial" pitchFamily="34" charset="0"/>
+                <a:cs typeface="Arial" pitchFamily="34" charset="0"/>
+              </a:rPr>
+              <a:t>E</a:t>
+            </a:r>
+            <a:endParaRPr lang="en-US" sz="800" dirty="0">
+              <a:solidFill>
+                <a:schemeClr val="tx1"/>
+              </a:solidFill>
+              <a:latin typeface="Arial" pitchFamily="34" charset="0"/>
+              <a:cs typeface="Arial" pitchFamily="34" charset="0"/>
+            </a:endParaRPr>
+          </a:p>
+        </p:txBody>
+      </p:sp>
+    </p:spTree>
+    <p:extLst>
+      <p:ext uri="{BB962C8B-B14F-4D97-AF65-F5344CB8AC3E}">
+        <p14:creationId xmlns:p14="http://schemas.microsoft.com/office/powerpoint/2010/main" val="965364603"/>
+      </p:ext>
+    </p:extLst>
+  </p:cSld>
+  <p:clrMapOvr>
+    <a:masterClrMapping/>
+  </p:clrMapOvr>
+</p:sld>
+</file>
+
+<file path=ppt/slides/slide9.xml><?xml version="1.0" encoding="utf-8"?>
+<p:sld xmlns:a="http://schemas.openxmlformats.org/drawingml/2006/main" xmlns:r="http://schemas.openxmlformats.org/officeDocument/2006/relationships" xmlns:p="http://schemas.openxmlformats.org/presentationml/2006/main">
+  <p:cSld>
+    <p:spTree>
+      <p:nvGrpSpPr>
+        <p:cNvPr id="1" name=""/>
+        <p:cNvGrpSpPr/>
+        <p:nvPr/>
+      </p:nvGrpSpPr>
+      <p:grpSpPr>
+        <a:xfrm>
+          <a:off x="0" y="0"/>
+          <a:ext cx="0" cy="0"/>
+          <a:chOff x="0" y="0"/>
+          <a:chExt cx="0" cy="0"/>
+        </a:xfrm>
+      </p:grpSpPr>
+      <p:sp>
+        <p:nvSpPr>
+          <p:cNvPr id="2" name="Oval 1"/>
+          <p:cNvSpPr/>
+          <p:nvPr/>
+        </p:nvSpPr>
+        <p:spPr>
+          <a:xfrm>
+            <a:off x="1585119" y="45700"/>
+            <a:ext cx="230429" cy="230429"/>
+          </a:xfrm>
+          <a:prstGeom prst="ellipse">
+            <a:avLst/>
+          </a:prstGeom>
+          <a:solidFill>
+            <a:srgbClr val="A6CEE3"/>
+          </a:solidFill>
+          <a:ln w="12700">
+            <a:solidFill>
+              <a:schemeClr val="tx1"/>
+            </a:solidFill>
+          </a:ln>
+        </p:spPr>
+        <p:style>
+          <a:lnRef idx="2">
+            <a:schemeClr val="accent1">
+              <a:shade val="50000"/>
+            </a:schemeClr>
+          </a:lnRef>
+          <a:fillRef idx="1">
+            <a:schemeClr val="accent1"/>
+          </a:fillRef>
+          <a:effectRef idx="0">
+            <a:schemeClr val="accent1"/>
+          </a:effectRef>
+          <a:fontRef idx="minor">
+            <a:schemeClr val="lt1"/>
+          </a:fontRef>
+        </p:style>
+        <p:txBody>
+          <a:bodyPr rtlCol="0" anchor="ctr"/>
+          <a:lstStyle/>
+          <a:p>
+            <a:pPr algn="ctr"/>
+            <a:r>
+              <a:rPr lang="en-US" sz="800" dirty="0" smtClean="0">
+                <a:solidFill>
+                  <a:schemeClr val="tx1"/>
+                </a:solidFill>
+                <a:latin typeface="Arial" pitchFamily="34" charset="0"/>
+                <a:cs typeface="Arial" pitchFamily="34" charset="0"/>
+              </a:rPr>
+              <a:t>A</a:t>
+            </a:r>
+            <a:endParaRPr lang="en-US" sz="800" dirty="0">
+              <a:solidFill>
+                <a:schemeClr val="tx1"/>
+              </a:solidFill>
+              <a:latin typeface="Arial" pitchFamily="34" charset="0"/>
+              <a:cs typeface="Arial" pitchFamily="34" charset="0"/>
+            </a:endParaRPr>
+          </a:p>
+        </p:txBody>
+      </p:sp>
+      <p:sp>
+        <p:nvSpPr>
+          <p:cNvPr id="3" name="Oval 2"/>
+          <p:cNvSpPr/>
+          <p:nvPr/>
+        </p:nvSpPr>
+        <p:spPr>
+          <a:xfrm>
+            <a:off x="2058041" y="45702"/>
+            <a:ext cx="230429" cy="230429"/>
+          </a:xfrm>
+          <a:prstGeom prst="ellipse">
+            <a:avLst/>
+          </a:prstGeom>
+          <a:solidFill>
+            <a:srgbClr val="FFFFCC"/>
+          </a:solidFill>
+          <a:ln w="12700">
+            <a:solidFill>
+              <a:schemeClr val="tx1"/>
+            </a:solidFill>
+          </a:ln>
+        </p:spPr>
+        <p:style>
+          <a:lnRef idx="2">
+            <a:schemeClr val="accent1">
+              <a:shade val="50000"/>
+            </a:schemeClr>
+          </a:lnRef>
+          <a:fillRef idx="1">
+            <a:schemeClr val="accent1"/>
+          </a:fillRef>
+          <a:effectRef idx="0">
+            <a:schemeClr val="accent1"/>
+          </a:effectRef>
+          <a:fontRef idx="minor">
+            <a:schemeClr val="lt1"/>
+          </a:fontRef>
+        </p:style>
+        <p:txBody>
+          <a:bodyPr rtlCol="0" anchor="ctr"/>
+          <a:lstStyle/>
+          <a:p>
+            <a:pPr algn="ctr"/>
+            <a:r>
+              <a:rPr lang="en-US" sz="800" dirty="0" smtClean="0">
+                <a:solidFill>
+                  <a:schemeClr val="tx1"/>
+                </a:solidFill>
+                <a:latin typeface="Arial" pitchFamily="34" charset="0"/>
+                <a:cs typeface="Arial" pitchFamily="34" charset="0"/>
+              </a:rPr>
+              <a:t>B</a:t>
+            </a:r>
+            <a:endParaRPr lang="en-US" sz="800" dirty="0">
+              <a:solidFill>
+                <a:schemeClr val="tx1"/>
+              </a:solidFill>
+              <a:latin typeface="Arial" pitchFamily="34" charset="0"/>
+              <a:cs typeface="Arial" pitchFamily="34" charset="0"/>
+            </a:endParaRPr>
+          </a:p>
+        </p:txBody>
+      </p:sp>
+      <p:cxnSp>
+        <p:nvCxnSpPr>
+          <p:cNvPr id="4" name="Straight Arrow Connector 3"/>
+          <p:cNvCxnSpPr>
+            <a:stCxn id="2" idx="6"/>
+            <a:endCxn id="3" idx="2"/>
+          </p:cNvCxnSpPr>
+          <p:nvPr/>
+        </p:nvCxnSpPr>
+        <p:spPr>
+          <a:xfrm>
+            <a:off x="1815548" y="160915"/>
+            <a:ext cx="242493" cy="2"/>
+          </a:xfrm>
+          <a:prstGeom prst="straightConnector1">
+            <a:avLst/>
+          </a:prstGeom>
+          <a:ln w="12700">
+            <a:solidFill>
+              <a:schemeClr val="tx1"/>
+            </a:solidFill>
+            <a:headEnd w="sm" len="sm"/>
+            <a:tailEnd type="triangle" w="med" len="med"/>
+          </a:ln>
+        </p:spPr>
+        <p:style>
+          <a:lnRef idx="1">
+            <a:schemeClr val="accent1"/>
+          </a:lnRef>
+          <a:fillRef idx="0">
+            <a:schemeClr val="accent1"/>
+          </a:fillRef>
+          <a:effectRef idx="0">
+            <a:schemeClr val="accent1"/>
+          </a:effectRef>
+          <a:fontRef idx="minor">
+            <a:schemeClr val="tx1"/>
+          </a:fontRef>
+        </p:style>
+      </p:cxnSp>
+      <p:sp>
+        <p:nvSpPr>
+          <p:cNvPr id="5" name="Oval 4"/>
+          <p:cNvSpPr/>
+          <p:nvPr/>
+        </p:nvSpPr>
+        <p:spPr>
+          <a:xfrm>
+            <a:off x="2530963" y="46022"/>
+            <a:ext cx="230429" cy="230429"/>
+          </a:xfrm>
+          <a:prstGeom prst="ellipse">
+            <a:avLst/>
+          </a:prstGeom>
+          <a:solidFill>
+            <a:srgbClr val="A6CEE3"/>
+          </a:solidFill>
+          <a:ln w="12700">
+            <a:solidFill>
+              <a:schemeClr val="tx1"/>
+            </a:solidFill>
+          </a:ln>
+        </p:spPr>
+        <p:style>
+          <a:lnRef idx="2">
+            <a:schemeClr val="accent1">
+              <a:shade val="50000"/>
+            </a:schemeClr>
+          </a:lnRef>
+          <a:fillRef idx="1">
+            <a:schemeClr val="accent1"/>
+          </a:fillRef>
+          <a:effectRef idx="0">
+            <a:schemeClr val="accent1"/>
+          </a:effectRef>
+          <a:fontRef idx="minor">
+            <a:schemeClr val="lt1"/>
+          </a:fontRef>
+        </p:style>
+        <p:txBody>
+          <a:bodyPr rtlCol="0" anchor="ctr"/>
+          <a:lstStyle/>
+          <a:p>
+            <a:pPr algn="ctr"/>
+            <a:r>
+              <a:rPr lang="en-US" sz="800" dirty="0" smtClean="0">
+                <a:solidFill>
+                  <a:schemeClr val="tx1"/>
+                </a:solidFill>
+                <a:latin typeface="Arial" pitchFamily="34" charset="0"/>
+                <a:cs typeface="Arial" pitchFamily="34" charset="0"/>
+              </a:rPr>
+              <a:t>C</a:t>
+            </a:r>
+            <a:endParaRPr lang="en-US" sz="800" dirty="0">
+              <a:solidFill>
+                <a:schemeClr val="tx1"/>
+              </a:solidFill>
+              <a:latin typeface="Arial" pitchFamily="34" charset="0"/>
+              <a:cs typeface="Arial" pitchFamily="34" charset="0"/>
+            </a:endParaRPr>
+          </a:p>
+        </p:txBody>
+      </p:sp>
+      <p:cxnSp>
+        <p:nvCxnSpPr>
+          <p:cNvPr id="6" name="Straight Arrow Connector 5"/>
+          <p:cNvCxnSpPr/>
+          <p:nvPr/>
+        </p:nvCxnSpPr>
+        <p:spPr>
+          <a:xfrm>
+            <a:off x="2288470" y="161240"/>
+            <a:ext cx="242493" cy="2"/>
+          </a:xfrm>
+          <a:prstGeom prst="straightConnector1">
+            <a:avLst/>
+          </a:prstGeom>
+          <a:ln w="12700">
+            <a:solidFill>
+              <a:schemeClr val="tx1"/>
+            </a:solidFill>
+            <a:headEnd w="sm" len="sm"/>
+            <a:tailEnd type="triangle" w="med" len="med"/>
+          </a:ln>
+        </p:spPr>
+        <p:style>
+          <a:lnRef idx="1">
+            <a:schemeClr val="accent1"/>
+          </a:lnRef>
+          <a:fillRef idx="0">
+            <a:schemeClr val="accent1"/>
+          </a:fillRef>
+          <a:effectRef idx="0">
+            <a:schemeClr val="accent1"/>
+          </a:effectRef>
+          <a:fontRef idx="minor">
+            <a:schemeClr val="tx1"/>
+          </a:fontRef>
+        </p:style>
+      </p:cxnSp>
+      <p:sp>
+        <p:nvSpPr>
+          <p:cNvPr id="7" name="Oval 6"/>
+          <p:cNvSpPr/>
+          <p:nvPr/>
+        </p:nvSpPr>
+        <p:spPr>
+          <a:xfrm>
+            <a:off x="3003885" y="46022"/>
+            <a:ext cx="230429" cy="230429"/>
+          </a:xfrm>
+          <a:prstGeom prst="ellipse">
+            <a:avLst/>
+          </a:prstGeom>
+          <a:solidFill>
+            <a:srgbClr val="FFFFCC"/>
+          </a:solidFill>
+          <a:ln w="12700">
+            <a:solidFill>
+              <a:schemeClr val="tx1"/>
+            </a:solidFill>
+          </a:ln>
+        </p:spPr>
+        <p:style>
+          <a:lnRef idx="2">
+            <a:schemeClr val="accent1">
+              <a:shade val="50000"/>
+            </a:schemeClr>
+          </a:lnRef>
+          <a:fillRef idx="1">
+            <a:schemeClr val="accent1"/>
+          </a:fillRef>
+          <a:effectRef idx="0">
+            <a:schemeClr val="accent1"/>
+          </a:effectRef>
+          <a:fontRef idx="minor">
+            <a:schemeClr val="lt1"/>
+          </a:fontRef>
+        </p:style>
+        <p:txBody>
+          <a:bodyPr rtlCol="0" anchor="ctr"/>
+          <a:lstStyle/>
+          <a:p>
+            <a:pPr algn="ctr"/>
+            <a:r>
+              <a:rPr lang="en-US" sz="800" dirty="0">
+                <a:solidFill>
+                  <a:schemeClr val="tx1"/>
+                </a:solidFill>
+                <a:latin typeface="Arial" pitchFamily="34" charset="0"/>
+                <a:cs typeface="Arial" pitchFamily="34" charset="0"/>
+              </a:rPr>
+              <a:t>D</a:t>
+            </a:r>
+          </a:p>
+        </p:txBody>
+      </p:sp>
+      <p:cxnSp>
+        <p:nvCxnSpPr>
+          <p:cNvPr id="8" name="Straight Arrow Connector 7"/>
+          <p:cNvCxnSpPr/>
+          <p:nvPr/>
+        </p:nvCxnSpPr>
+        <p:spPr>
+          <a:xfrm>
+            <a:off x="2761392" y="161238"/>
+            <a:ext cx="242493" cy="2"/>
+          </a:xfrm>
+          <a:prstGeom prst="straightConnector1">
+            <a:avLst/>
+          </a:prstGeom>
+          <a:ln w="12700">
+            <a:solidFill>
+              <a:schemeClr val="tx1"/>
+            </a:solidFill>
+            <a:headEnd w="sm" len="sm"/>
+            <a:tailEnd type="triangle" w="med" len="med"/>
+          </a:ln>
+        </p:spPr>
+        <p:style>
+          <a:lnRef idx="1">
+            <a:schemeClr val="accent1"/>
+          </a:lnRef>
+          <a:fillRef idx="0">
+            <a:schemeClr val="accent1"/>
+          </a:fillRef>
+          <a:effectRef idx="0">
+            <a:schemeClr val="accent1"/>
+          </a:effectRef>
+          <a:fontRef idx="minor">
+            <a:schemeClr val="tx1"/>
+          </a:fontRef>
+        </p:style>
+      </p:cxnSp>
+      <p:cxnSp>
+        <p:nvCxnSpPr>
+          <p:cNvPr id="9" name="Straight Arrow Connector 8"/>
+          <p:cNvCxnSpPr/>
+          <p:nvPr/>
+        </p:nvCxnSpPr>
+        <p:spPr>
+          <a:xfrm>
+            <a:off x="3234314" y="161236"/>
+            <a:ext cx="242493" cy="2"/>
+          </a:xfrm>
+          <a:prstGeom prst="straightConnector1">
+            <a:avLst/>
+          </a:prstGeom>
+          <a:ln w="12700">
+            <a:solidFill>
+              <a:schemeClr val="tx1"/>
+            </a:solidFill>
+            <a:headEnd w="sm" len="sm"/>
+            <a:tailEnd type="triangle" w="med" len="med"/>
+          </a:ln>
+        </p:spPr>
+        <p:style>
+          <a:lnRef idx="1">
+            <a:schemeClr val="accent1"/>
+          </a:lnRef>
+          <a:fillRef idx="0">
+            <a:schemeClr val="accent1"/>
+          </a:fillRef>
+          <a:effectRef idx="0">
+            <a:schemeClr val="accent1"/>
+          </a:effectRef>
+          <a:fontRef idx="minor">
+            <a:schemeClr val="tx1"/>
+          </a:fontRef>
+        </p:style>
+      </p:cxnSp>
+      <p:sp>
+        <p:nvSpPr>
+          <p:cNvPr id="10" name="Oval 9"/>
+          <p:cNvSpPr/>
+          <p:nvPr/>
+        </p:nvSpPr>
+        <p:spPr>
+          <a:xfrm>
+            <a:off x="2530962" y="343520"/>
+            <a:ext cx="230429" cy="230429"/>
+          </a:xfrm>
+          <a:prstGeom prst="ellipse">
+            <a:avLst/>
+          </a:prstGeom>
+          <a:solidFill>
+            <a:srgbClr val="A6CEE3"/>
+          </a:solidFill>
+          <a:ln w="12700">
+            <a:solidFill>
+              <a:schemeClr val="tx1"/>
+            </a:solidFill>
+          </a:ln>
+        </p:spPr>
+        <p:style>
+          <a:lnRef idx="2">
+            <a:schemeClr val="accent1">
+              <a:shade val="50000"/>
+            </a:schemeClr>
+          </a:lnRef>
+          <a:fillRef idx="1">
+            <a:schemeClr val="accent1"/>
+          </a:fillRef>
+          <a:effectRef idx="0">
+            <a:schemeClr val="accent1"/>
+          </a:effectRef>
+          <a:fontRef idx="minor">
+            <a:schemeClr val="lt1"/>
+          </a:fontRef>
+        </p:style>
+        <p:txBody>
+          <a:bodyPr rtlCol="0" anchor="ctr"/>
+          <a:lstStyle/>
+          <a:p>
+            <a:pPr algn="ctr"/>
+            <a:r>
+              <a:rPr lang="en-US" sz="800" dirty="0">
+                <a:solidFill>
+                  <a:schemeClr val="tx1"/>
+                </a:solidFill>
+                <a:latin typeface="Arial" pitchFamily="34" charset="0"/>
+                <a:cs typeface="Arial" pitchFamily="34" charset="0"/>
+              </a:rPr>
+              <a:t>F</a:t>
+            </a:r>
+          </a:p>
+        </p:txBody>
+      </p:sp>
+      <p:cxnSp>
+        <p:nvCxnSpPr>
+          <p:cNvPr id="11" name="Straight Arrow Connector 10"/>
+          <p:cNvCxnSpPr>
+            <a:stCxn id="3" idx="5"/>
+            <a:endCxn id="10" idx="2"/>
+          </p:cNvCxnSpPr>
+          <p:nvPr/>
+        </p:nvCxnSpPr>
+        <p:spPr>
+          <a:xfrm>
+            <a:off x="2254724" y="242385"/>
+            <a:ext cx="276238" cy="216350"/>
+          </a:xfrm>
+          <a:prstGeom prst="straightConnector1">
+            <a:avLst/>
+          </a:prstGeom>
+          <a:ln w="12700">
+            <a:solidFill>
+              <a:schemeClr val="tx1"/>
+            </a:solidFill>
+            <a:headEnd w="sm" len="sm"/>
+            <a:tailEnd type="triangle" w="med" len="med"/>
+          </a:ln>
+        </p:spPr>
+        <p:style>
+          <a:lnRef idx="1">
+            <a:schemeClr val="accent1"/>
+          </a:lnRef>
+          <a:fillRef idx="0">
+            <a:schemeClr val="accent1"/>
+          </a:fillRef>
+          <a:effectRef idx="0">
+            <a:schemeClr val="accent1"/>
+          </a:effectRef>
+          <a:fontRef idx="minor">
+            <a:schemeClr val="tx1"/>
+          </a:fontRef>
+        </p:style>
+      </p:cxnSp>
+      <p:cxnSp>
+        <p:nvCxnSpPr>
+          <p:cNvPr id="12" name="Straight Arrow Connector 11"/>
+          <p:cNvCxnSpPr/>
+          <p:nvPr/>
+        </p:nvCxnSpPr>
+        <p:spPr>
+          <a:xfrm>
+            <a:off x="2764944" y="458735"/>
+            <a:ext cx="242493" cy="2"/>
+          </a:xfrm>
+          <a:prstGeom prst="straightConnector1">
+            <a:avLst/>
+          </a:prstGeom>
+          <a:ln w="12700">
+            <a:solidFill>
+              <a:schemeClr val="tx1"/>
+            </a:solidFill>
+            <a:headEnd w="sm" len="sm"/>
+            <a:tailEnd type="triangle" w="med" len="med"/>
+          </a:ln>
+        </p:spPr>
+        <p:style>
+          <a:lnRef idx="1">
+            <a:schemeClr val="accent1"/>
+          </a:lnRef>
+          <a:fillRef idx="0">
+            <a:schemeClr val="accent1"/>
+          </a:fillRef>
+          <a:effectRef idx="0">
+            <a:schemeClr val="accent1"/>
+          </a:effectRef>
+          <a:fontRef idx="minor">
+            <a:schemeClr val="tx1"/>
+          </a:fontRef>
+        </p:style>
+      </p:cxnSp>
+      <p:sp>
+        <p:nvSpPr>
+          <p:cNvPr id="13" name="Rectangle 12"/>
+          <p:cNvSpPr/>
+          <p:nvPr/>
+        </p:nvSpPr>
+        <p:spPr>
+          <a:xfrm>
+            <a:off x="3007437" y="343520"/>
+            <a:ext cx="230429" cy="230429"/>
+          </a:xfrm>
+          <a:prstGeom prst="rect">
+            <a:avLst/>
+          </a:prstGeom>
+          <a:solidFill>
+            <a:srgbClr val="FFFFCC"/>
+          </a:solidFill>
+          <a:ln w="12700">
+            <a:solidFill>
+              <a:schemeClr val="tx1"/>
+            </a:solidFill>
+          </a:ln>
+        </p:spPr>
+        <p:style>
+          <a:lnRef idx="2">
+            <a:schemeClr val="accent1">
+              <a:shade val="50000"/>
+            </a:schemeClr>
+          </a:lnRef>
+          <a:fillRef idx="1">
+            <a:schemeClr val="accent1"/>
+          </a:fillRef>
+          <a:effectRef idx="0">
+            <a:schemeClr val="accent1"/>
+          </a:effectRef>
+          <a:fontRef idx="minor">
+            <a:schemeClr val="lt1"/>
+          </a:fontRef>
+        </p:style>
+        <p:txBody>
+          <a:bodyPr rtlCol="0" anchor="ctr"/>
+          <a:lstStyle/>
+          <a:p>
+            <a:pPr algn="ctr"/>
+            <a:r>
+              <a:rPr lang="en-US" sz="800" dirty="0" smtClean="0">
+                <a:solidFill>
+                  <a:schemeClr val="tx1"/>
+                </a:solidFill>
+                <a:latin typeface="Arial" pitchFamily="34" charset="0"/>
+                <a:cs typeface="Arial" pitchFamily="34" charset="0"/>
+              </a:rPr>
+              <a:t>G</a:t>
+            </a:r>
+            <a:endParaRPr lang="en-US" sz="800" dirty="0">
+              <a:solidFill>
+                <a:schemeClr val="tx1"/>
+              </a:solidFill>
+              <a:latin typeface="Arial" pitchFamily="34" charset="0"/>
+              <a:cs typeface="Arial" pitchFamily="34" charset="0"/>
+            </a:endParaRPr>
+          </a:p>
+        </p:txBody>
+      </p:sp>
+      <p:sp>
+        <p:nvSpPr>
+          <p:cNvPr id="14" name="Rectangle 13"/>
+          <p:cNvSpPr/>
+          <p:nvPr/>
+        </p:nvSpPr>
+        <p:spPr>
+          <a:xfrm>
+            <a:off x="3476807" y="45699"/>
+            <a:ext cx="230429" cy="230429"/>
+          </a:xfrm>
+          <a:prstGeom prst="rect">
+            <a:avLst/>
+          </a:prstGeom>
+          <a:solidFill>
+            <a:srgbClr val="FFFFCC"/>
+          </a:solidFill>
+          <a:ln w="12700">
+            <a:solidFill>
+              <a:schemeClr val="tx1"/>
+            </a:solidFill>
+          </a:ln>
+        </p:spPr>
+        <p:style>
+          <a:lnRef idx="2">
+            <a:schemeClr val="accent1">
+              <a:shade val="50000"/>
+            </a:schemeClr>
+          </a:lnRef>
+          <a:fillRef idx="1">
+            <a:schemeClr val="accent1"/>
+          </a:fillRef>
+          <a:effectRef idx="0">
+            <a:schemeClr val="accent1"/>
+          </a:effectRef>
+          <a:fontRef idx="minor">
+            <a:schemeClr val="lt1"/>
+          </a:fontRef>
+        </p:style>
+        <p:txBody>
+          <a:bodyPr rtlCol="0" anchor="ctr"/>
+          <a:lstStyle/>
+          <a:p>
+            <a:pPr algn="ctr"/>
+            <a:r>
+              <a:rPr lang="en-US" sz="800" dirty="0" smtClean="0">
+                <a:solidFill>
+                  <a:schemeClr val="tx1"/>
+                </a:solidFill>
+                <a:latin typeface="Arial" pitchFamily="34" charset="0"/>
+                <a:cs typeface="Arial" pitchFamily="34" charset="0"/>
+              </a:rPr>
+              <a:t>E</a:t>
+            </a:r>
+            <a:endParaRPr lang="en-US" sz="800" dirty="0">
+              <a:solidFill>
+                <a:schemeClr val="tx1"/>
+              </a:solidFill>
+              <a:latin typeface="Arial" pitchFamily="34" charset="0"/>
+              <a:cs typeface="Arial" pitchFamily="34" charset="0"/>
+            </a:endParaRPr>
+          </a:p>
+        </p:txBody>
+      </p:sp>
+    </p:spTree>
+    <p:extLst>
+      <p:ext uri="{BB962C8B-B14F-4D97-AF65-F5344CB8AC3E}">
+        <p14:creationId xmlns:p14="http://schemas.microsoft.com/office/powerpoint/2010/main" val="1895283960"/>
       </p:ext>
     </p:extLst>
   </p:cSld>

</xml_diff>